<commit_message>
Add React and Redux
Commit
</commit_message>
<xml_diff>
--- a/ReactJS/01-Typescript/PPT/Typescript.pptx
+++ b/ReactJS/01-Typescript/PPT/Typescript.pptx
@@ -5,10 +5,10 @@
     <p:sldMasterId id="2147483861" r:id="rId4"/>
   </p:sldMasterIdLst>
   <p:notesMasterIdLst>
-    <p:notesMasterId r:id="rId47"/>
+    <p:notesMasterId r:id="rId48"/>
   </p:notesMasterIdLst>
   <p:handoutMasterIdLst>
-    <p:handoutMasterId r:id="rId48"/>
+    <p:handoutMasterId r:id="rId49"/>
   </p:handoutMasterIdLst>
   <p:sldIdLst>
     <p:sldId id="287" r:id="rId5"/>
@@ -17,42 +17,43 @@
     <p:sldId id="291" r:id="rId8"/>
     <p:sldId id="292" r:id="rId9"/>
     <p:sldId id="293" r:id="rId10"/>
-    <p:sldId id="290" r:id="rId11"/>
-    <p:sldId id="294" r:id="rId12"/>
-    <p:sldId id="295" r:id="rId13"/>
-    <p:sldId id="296" r:id="rId14"/>
-    <p:sldId id="297" r:id="rId15"/>
-    <p:sldId id="298" r:id="rId16"/>
-    <p:sldId id="299" r:id="rId17"/>
-    <p:sldId id="300" r:id="rId18"/>
-    <p:sldId id="301" r:id="rId19"/>
-    <p:sldId id="302" r:id="rId20"/>
-    <p:sldId id="303" r:id="rId21"/>
-    <p:sldId id="304" r:id="rId22"/>
-    <p:sldId id="305" r:id="rId23"/>
-    <p:sldId id="306" r:id="rId24"/>
-    <p:sldId id="307" r:id="rId25"/>
-    <p:sldId id="308" r:id="rId26"/>
-    <p:sldId id="309" r:id="rId27"/>
-    <p:sldId id="310" r:id="rId28"/>
-    <p:sldId id="311" r:id="rId29"/>
-    <p:sldId id="312" r:id="rId30"/>
-    <p:sldId id="313" r:id="rId31"/>
-    <p:sldId id="314" r:id="rId32"/>
-    <p:sldId id="315" r:id="rId33"/>
-    <p:sldId id="316" r:id="rId34"/>
-    <p:sldId id="317" r:id="rId35"/>
-    <p:sldId id="318" r:id="rId36"/>
-    <p:sldId id="319" r:id="rId37"/>
-    <p:sldId id="320" r:id="rId38"/>
-    <p:sldId id="321" r:id="rId39"/>
-    <p:sldId id="322" r:id="rId40"/>
-    <p:sldId id="323" r:id="rId41"/>
-    <p:sldId id="324" r:id="rId42"/>
-    <p:sldId id="325" r:id="rId43"/>
-    <p:sldId id="326" r:id="rId44"/>
-    <p:sldId id="327" r:id="rId45"/>
-    <p:sldId id="328" r:id="rId46"/>
+    <p:sldId id="329" r:id="rId11"/>
+    <p:sldId id="290" r:id="rId12"/>
+    <p:sldId id="294" r:id="rId13"/>
+    <p:sldId id="295" r:id="rId14"/>
+    <p:sldId id="296" r:id="rId15"/>
+    <p:sldId id="297" r:id="rId16"/>
+    <p:sldId id="298" r:id="rId17"/>
+    <p:sldId id="299" r:id="rId18"/>
+    <p:sldId id="300" r:id="rId19"/>
+    <p:sldId id="301" r:id="rId20"/>
+    <p:sldId id="302" r:id="rId21"/>
+    <p:sldId id="303" r:id="rId22"/>
+    <p:sldId id="304" r:id="rId23"/>
+    <p:sldId id="305" r:id="rId24"/>
+    <p:sldId id="306" r:id="rId25"/>
+    <p:sldId id="307" r:id="rId26"/>
+    <p:sldId id="308" r:id="rId27"/>
+    <p:sldId id="309" r:id="rId28"/>
+    <p:sldId id="310" r:id="rId29"/>
+    <p:sldId id="311" r:id="rId30"/>
+    <p:sldId id="312" r:id="rId31"/>
+    <p:sldId id="313" r:id="rId32"/>
+    <p:sldId id="314" r:id="rId33"/>
+    <p:sldId id="315" r:id="rId34"/>
+    <p:sldId id="316" r:id="rId35"/>
+    <p:sldId id="317" r:id="rId36"/>
+    <p:sldId id="318" r:id="rId37"/>
+    <p:sldId id="319" r:id="rId38"/>
+    <p:sldId id="320" r:id="rId39"/>
+    <p:sldId id="321" r:id="rId40"/>
+    <p:sldId id="322" r:id="rId41"/>
+    <p:sldId id="323" r:id="rId42"/>
+    <p:sldId id="324" r:id="rId43"/>
+    <p:sldId id="325" r:id="rId44"/>
+    <p:sldId id="326" r:id="rId45"/>
+    <p:sldId id="327" r:id="rId46"/>
+    <p:sldId id="328" r:id="rId47"/>
   </p:sldIdLst>
   <p:sldSz cx="13442950" cy="7561263"/>
   <p:notesSz cx="6858000" cy="9144000"/>
@@ -20014,35 +20015,10 @@
       </p:grpSpPr>
       <p:sp>
         <p:nvSpPr>
-          <p:cNvPr id="4" name="Marcador de contenido 3">
+          <p:cNvPr id="5" name="Título 4">
             <a:extLst>
               <a:ext uri="{FF2B5EF4-FFF2-40B4-BE49-F238E27FC236}">
-                <a16:creationId xmlns:a16="http://schemas.microsoft.com/office/drawing/2014/main" id="{A75245C2-5B13-4008-AB95-BB9387323509}"/>
-              </a:ext>
-            </a:extLst>
-          </p:cNvPr>
-          <p:cNvSpPr>
-            <a:spLocks noGrp="1"/>
-          </p:cNvSpPr>
-          <p:nvPr>
-            <p:ph idx="1"/>
-          </p:nvPr>
-        </p:nvSpPr>
-        <p:spPr/>
-        <p:txBody>
-          <a:bodyPr/>
-          <a:lstStyle/>
-          <a:p>
-            <a:endParaRPr lang="es-ES"/>
-          </a:p>
-        </p:txBody>
-      </p:sp>
-      <p:sp>
-        <p:nvSpPr>
-          <p:cNvPr id="3" name="Título 2">
-            <a:extLst>
-              <a:ext uri="{FF2B5EF4-FFF2-40B4-BE49-F238E27FC236}">
-                <a16:creationId xmlns:a16="http://schemas.microsoft.com/office/drawing/2014/main" id="{1EAA61BA-60F1-4FDD-8353-5CC59747BA2E}"/>
+                <a16:creationId xmlns:a16="http://schemas.microsoft.com/office/drawing/2014/main" id="{351C640C-3C52-429A-B6F6-C706D06F6FB1}"/>
               </a:ext>
             </a:extLst>
           </p:cNvPr>
@@ -20058,44 +20034,103 @@
           <a:bodyPr/>
           <a:lstStyle/>
           <a:p>
-            <a:endParaRPr lang="es-ES"/>
+            <a:r>
+              <a:rPr lang="es-ES" dirty="0"/>
+              <a:t>Tipos  </a:t>
+            </a:r>
+          </a:p>
+        </p:txBody>
+      </p:sp>
+      <p:sp>
+        <p:nvSpPr>
+          <p:cNvPr id="4" name="Marcador de número de diapositiva 3">
+            <a:extLst>
+              <a:ext uri="{FF2B5EF4-FFF2-40B4-BE49-F238E27FC236}">
+                <a16:creationId xmlns:a16="http://schemas.microsoft.com/office/drawing/2014/main" id="{B3ABA005-E654-4189-9CC8-13F86F34DFC4}"/>
+              </a:ext>
+            </a:extLst>
+          </p:cNvPr>
+          <p:cNvSpPr>
+            <a:spLocks noGrp="1"/>
+          </p:cNvSpPr>
+          <p:nvPr>
+            <p:ph type="sldNum" sz="quarter" idx="4294967295"/>
+          </p:nvPr>
+        </p:nvSpPr>
+        <p:spPr>
+          <a:xfrm>
+            <a:off x="0" y="6897688"/>
+            <a:ext cx="661988" cy="468312"/>
+          </a:xfrm>
+        </p:spPr>
+        <p:txBody>
+          <a:bodyPr/>
+          <a:lstStyle/>
+          <a:p>
+            <a:fld id="{C0C6E1E5-C711-49C2-AC1C-A8C0A200779D}" type="slidenum">
+              <a:rPr lang="es-ES" smtClean="0">
+                <a:cs typeface="Segoe UI Light" panose="020B0502040204020203" pitchFamily="34" charset="0"/>
+              </a:rPr>
+              <a:pPr/>
+              <a:t>10</a:t>
+            </a:fld>
+            <a:endParaRPr lang="es-ES" dirty="0">
+              <a:cs typeface="Segoe UI Light" panose="020B0502040204020203" pitchFamily="34" charset="0"/>
+            </a:endParaRPr>
           </a:p>
         </p:txBody>
       </p:sp>
       <p:pic>
         <p:nvPicPr>
-          <p:cNvPr id="5" name="Imagen 4">
+          <p:cNvPr id="3074" name="Picture 2" descr="Imagen relacionada">
             <a:extLst>
               <a:ext uri="{FF2B5EF4-FFF2-40B4-BE49-F238E27FC236}">
-                <a16:creationId xmlns:a16="http://schemas.microsoft.com/office/drawing/2014/main" id="{366CB619-F1D5-4B41-8F76-76AE7062FD39}"/>
+                <a16:creationId xmlns:a16="http://schemas.microsoft.com/office/drawing/2014/main" id="{6C230BBC-2B32-4AB7-A0DD-02E9BF6FDD87}"/>
               </a:ext>
             </a:extLst>
           </p:cNvPr>
           <p:cNvPicPr>
-            <a:picLocks noChangeAspect="1"/>
+            <a:picLocks noChangeAspect="1" noChangeArrowheads="1"/>
           </p:cNvPicPr>
           <p:nvPr/>
         </p:nvPicPr>
         <p:blipFill>
-          <a:blip r:embed="rId2"/>
+          <a:blip r:embed="rId2">
+            <a:extLst>
+              <a:ext uri="{28A0092B-C50C-407E-A947-70E740481C1C}">
+                <a14:useLocalDpi xmlns:a14="http://schemas.microsoft.com/office/drawing/2010/main" val="0"/>
+              </a:ext>
+            </a:extLst>
+          </a:blip>
+          <a:srcRect/>
           <a:stretch>
             <a:fillRect/>
           </a:stretch>
         </p:blipFill>
-        <p:spPr>
-          <a:xfrm>
-            <a:off x="960835" y="302802"/>
-            <a:ext cx="11593288" cy="6587742"/>
-          </a:xfrm>
-          <a:prstGeom prst="rect">
-            <a:avLst/>
-          </a:prstGeom>
+        <p:spPr bwMode="auto">
+          <a:xfrm>
+            <a:off x="8011617" y="1836415"/>
+            <a:ext cx="4686521" cy="3960440"/>
+          </a:xfrm>
+          <a:prstGeom prst="rect">
+            <a:avLst/>
+          </a:prstGeom>
+          <a:noFill/>
+          <a:extLst>
+            <a:ext uri="{909E8E84-426E-40DD-AFC4-6F175D3DCCD1}">
+              <a14:hiddenFill xmlns:a14="http://schemas.microsoft.com/office/drawing/2010/main">
+                <a:solidFill>
+                  <a:srgbClr val="FFFFFF"/>
+                </a:solidFill>
+              </a14:hiddenFill>
+            </a:ext>
+          </a:extLst>
         </p:spPr>
       </p:pic>
     </p:spTree>
     <p:extLst>
       <p:ext uri="{BB962C8B-B14F-4D97-AF65-F5344CB8AC3E}">
-        <p14:creationId xmlns:p14="http://schemas.microsoft.com/office/powerpoint/2010/main" val="3773569055"/>
+        <p14:creationId xmlns:p14="http://schemas.microsoft.com/office/powerpoint/2010/main" val="1339072026"/>
       </p:ext>
     </p:extLst>
   </p:cSld>
@@ -20124,10 +20159,10 @@
       </p:grpSpPr>
       <p:sp>
         <p:nvSpPr>
-          <p:cNvPr id="2" name="Marcador de contenido 1">
+          <p:cNvPr id="4" name="Marcador de contenido 3">
             <a:extLst>
               <a:ext uri="{FF2B5EF4-FFF2-40B4-BE49-F238E27FC236}">
-                <a16:creationId xmlns:a16="http://schemas.microsoft.com/office/drawing/2014/main" id="{A02BA473-23EE-4785-91E3-2B3B3C7791EB}"/>
+                <a16:creationId xmlns:a16="http://schemas.microsoft.com/office/drawing/2014/main" id="{A75245C2-5B13-4008-AB95-BB9387323509}"/>
               </a:ext>
             </a:extLst>
           </p:cNvPr>
@@ -20152,7 +20187,7 @@
           <p:cNvPr id="3" name="Título 2">
             <a:extLst>
               <a:ext uri="{FF2B5EF4-FFF2-40B4-BE49-F238E27FC236}">
-                <a16:creationId xmlns:a16="http://schemas.microsoft.com/office/drawing/2014/main" id="{D36A0113-E62E-4244-B83A-46202CB8BBA5}"/>
+                <a16:creationId xmlns:a16="http://schemas.microsoft.com/office/drawing/2014/main" id="{1EAA61BA-60F1-4FDD-8353-5CC59747BA2E}"/>
               </a:ext>
             </a:extLst>
           </p:cNvPr>
@@ -20172,46 +20207,12 @@
           </a:p>
         </p:txBody>
       </p:sp>
-      <p:sp>
-        <p:nvSpPr>
-          <p:cNvPr id="4" name="Marcador de número de diapositiva 3">
-            <a:extLst>
-              <a:ext uri="{FF2B5EF4-FFF2-40B4-BE49-F238E27FC236}">
-                <a16:creationId xmlns:a16="http://schemas.microsoft.com/office/drawing/2014/main" id="{C9D2EA6D-9A77-4B0F-8B2A-9091C9A95849}"/>
-              </a:ext>
-            </a:extLst>
-          </p:cNvPr>
-          <p:cNvSpPr>
-            <a:spLocks noGrp="1"/>
-          </p:cNvSpPr>
-          <p:nvPr>
-            <p:ph type="sldNum" sz="quarter" idx="4"/>
-          </p:nvPr>
-        </p:nvSpPr>
-        <p:spPr/>
-        <p:txBody>
-          <a:bodyPr/>
-          <a:lstStyle/>
-          <a:p>
-            <a:fld id="{C0C6E1E5-C711-49C2-AC1C-A8C0A200779D}" type="slidenum">
-              <a:rPr lang="es-ES" smtClean="0">
-                <a:cs typeface="Segoe UI Light" panose="020B0502040204020203" pitchFamily="34" charset="0"/>
-              </a:rPr>
-              <a:pPr/>
-              <a:t>11</a:t>
-            </a:fld>
-            <a:endParaRPr lang="es-ES" dirty="0">
-              <a:cs typeface="Segoe UI Light" panose="020B0502040204020203" pitchFamily="34" charset="0"/>
-            </a:endParaRPr>
-          </a:p>
-        </p:txBody>
-      </p:sp>
       <p:pic>
         <p:nvPicPr>
           <p:cNvPr id="5" name="Imagen 4">
             <a:extLst>
               <a:ext uri="{FF2B5EF4-FFF2-40B4-BE49-F238E27FC236}">
-                <a16:creationId xmlns:a16="http://schemas.microsoft.com/office/drawing/2014/main" id="{F0BC77E5-A56A-43CB-BE8A-C558AC882232}"/>
+                <a16:creationId xmlns:a16="http://schemas.microsoft.com/office/drawing/2014/main" id="{366CB619-F1D5-4B41-8F76-76AE7062FD39}"/>
               </a:ext>
             </a:extLst>
           </p:cNvPr>
@@ -20228,8 +20229,8 @@
         </p:blipFill>
         <p:spPr>
           <a:xfrm>
-            <a:off x="883769" y="612279"/>
-            <a:ext cx="11305255" cy="5641494"/>
+            <a:off x="960835" y="302802"/>
+            <a:ext cx="11593288" cy="6587742"/>
           </a:xfrm>
           <a:prstGeom prst="rect">
             <a:avLst/>
@@ -20239,7 +20240,7 @@
     </p:spTree>
     <p:extLst>
       <p:ext uri="{BB962C8B-B14F-4D97-AF65-F5344CB8AC3E}">
-        <p14:creationId xmlns:p14="http://schemas.microsoft.com/office/powerpoint/2010/main" val="658747990"/>
+        <p14:creationId xmlns:p14="http://schemas.microsoft.com/office/powerpoint/2010/main" val="3773569055"/>
       </p:ext>
     </p:extLst>
   </p:cSld>
@@ -20271,7 +20272,7 @@
           <p:cNvPr id="2" name="Marcador de contenido 1">
             <a:extLst>
               <a:ext uri="{FF2B5EF4-FFF2-40B4-BE49-F238E27FC236}">
-                <a16:creationId xmlns:a16="http://schemas.microsoft.com/office/drawing/2014/main" id="{078BC43D-009B-49AE-A2B7-385EE05F74CD}"/>
+                <a16:creationId xmlns:a16="http://schemas.microsoft.com/office/drawing/2014/main" id="{A02BA473-23EE-4785-91E3-2B3B3C7791EB}"/>
               </a:ext>
             </a:extLst>
           </p:cNvPr>
@@ -20296,7 +20297,7 @@
           <p:cNvPr id="3" name="Título 2">
             <a:extLst>
               <a:ext uri="{FF2B5EF4-FFF2-40B4-BE49-F238E27FC236}">
-                <a16:creationId xmlns:a16="http://schemas.microsoft.com/office/drawing/2014/main" id="{363B45E2-80D4-46FF-8CD8-E8DC6969CE17}"/>
+                <a16:creationId xmlns:a16="http://schemas.microsoft.com/office/drawing/2014/main" id="{D36A0113-E62E-4244-B83A-46202CB8BBA5}"/>
               </a:ext>
             </a:extLst>
           </p:cNvPr>
@@ -20321,7 +20322,7 @@
           <p:cNvPr id="4" name="Marcador de número de diapositiva 3">
             <a:extLst>
               <a:ext uri="{FF2B5EF4-FFF2-40B4-BE49-F238E27FC236}">
-                <a16:creationId xmlns:a16="http://schemas.microsoft.com/office/drawing/2014/main" id="{C9A27EF4-440D-4FAD-A9EB-C77B231B4428}"/>
+                <a16:creationId xmlns:a16="http://schemas.microsoft.com/office/drawing/2014/main" id="{C9D2EA6D-9A77-4B0F-8B2A-9091C9A95849}"/>
               </a:ext>
             </a:extLst>
           </p:cNvPr>
@@ -20355,7 +20356,7 @@
           <p:cNvPr id="5" name="Imagen 4">
             <a:extLst>
               <a:ext uri="{FF2B5EF4-FFF2-40B4-BE49-F238E27FC236}">
-                <a16:creationId xmlns:a16="http://schemas.microsoft.com/office/drawing/2014/main" id="{B4C5FBE2-E825-4020-96EB-A09F0EB2E713}"/>
+                <a16:creationId xmlns:a16="http://schemas.microsoft.com/office/drawing/2014/main" id="{F0BC77E5-A56A-43CB-BE8A-C558AC882232}"/>
               </a:ext>
             </a:extLst>
           </p:cNvPr>
@@ -20372,8 +20373,8 @@
         </p:blipFill>
         <p:spPr>
           <a:xfrm>
-            <a:off x="1176859" y="1218519"/>
-            <a:ext cx="10896600" cy="4810125"/>
+            <a:off x="883769" y="612279"/>
+            <a:ext cx="11305255" cy="5641494"/>
           </a:xfrm>
           <a:prstGeom prst="rect">
             <a:avLst/>
@@ -20383,7 +20384,7 @@
     </p:spTree>
     <p:extLst>
       <p:ext uri="{BB962C8B-B14F-4D97-AF65-F5344CB8AC3E}">
-        <p14:creationId xmlns:p14="http://schemas.microsoft.com/office/powerpoint/2010/main" val="1767658799"/>
+        <p14:creationId xmlns:p14="http://schemas.microsoft.com/office/powerpoint/2010/main" val="658747990"/>
       </p:ext>
     </p:extLst>
   </p:cSld>
@@ -20415,7 +20416,7 @@
           <p:cNvPr id="2" name="Marcador de contenido 1">
             <a:extLst>
               <a:ext uri="{FF2B5EF4-FFF2-40B4-BE49-F238E27FC236}">
-                <a16:creationId xmlns:a16="http://schemas.microsoft.com/office/drawing/2014/main" id="{6A35F60C-3920-4BF8-B6AA-2042C219580D}"/>
+                <a16:creationId xmlns:a16="http://schemas.microsoft.com/office/drawing/2014/main" id="{078BC43D-009B-49AE-A2B7-385EE05F74CD}"/>
               </a:ext>
             </a:extLst>
           </p:cNvPr>
@@ -20440,7 +20441,7 @@
           <p:cNvPr id="3" name="Título 2">
             <a:extLst>
               <a:ext uri="{FF2B5EF4-FFF2-40B4-BE49-F238E27FC236}">
-                <a16:creationId xmlns:a16="http://schemas.microsoft.com/office/drawing/2014/main" id="{359DC2A4-3370-49AF-BC95-A4C49A7283D8}"/>
+                <a16:creationId xmlns:a16="http://schemas.microsoft.com/office/drawing/2014/main" id="{363B45E2-80D4-46FF-8CD8-E8DC6969CE17}"/>
               </a:ext>
             </a:extLst>
           </p:cNvPr>
@@ -20465,7 +20466,7 @@
           <p:cNvPr id="4" name="Marcador de número de diapositiva 3">
             <a:extLst>
               <a:ext uri="{FF2B5EF4-FFF2-40B4-BE49-F238E27FC236}">
-                <a16:creationId xmlns:a16="http://schemas.microsoft.com/office/drawing/2014/main" id="{BC3CDB0B-1415-40A2-8654-5B42CC679F2F}"/>
+                <a16:creationId xmlns:a16="http://schemas.microsoft.com/office/drawing/2014/main" id="{C9A27EF4-440D-4FAD-A9EB-C77B231B4428}"/>
               </a:ext>
             </a:extLst>
           </p:cNvPr>
@@ -20499,7 +20500,7 @@
           <p:cNvPr id="5" name="Imagen 4">
             <a:extLst>
               <a:ext uri="{FF2B5EF4-FFF2-40B4-BE49-F238E27FC236}">
-                <a16:creationId xmlns:a16="http://schemas.microsoft.com/office/drawing/2014/main" id="{C4589494-C544-41C3-8680-1FFAC515B16B}"/>
+                <a16:creationId xmlns:a16="http://schemas.microsoft.com/office/drawing/2014/main" id="{B4C5FBE2-E825-4020-96EB-A09F0EB2E713}"/>
               </a:ext>
             </a:extLst>
           </p:cNvPr>
@@ -20516,8 +20517,8 @@
         </p:blipFill>
         <p:spPr>
           <a:xfrm>
-            <a:off x="1896939" y="468263"/>
-            <a:ext cx="9734550" cy="6057900"/>
+            <a:off x="1176859" y="1218519"/>
+            <a:ext cx="10896600" cy="4810125"/>
           </a:xfrm>
           <a:prstGeom prst="rect">
             <a:avLst/>
@@ -20527,7 +20528,7 @@
     </p:spTree>
     <p:extLst>
       <p:ext uri="{BB962C8B-B14F-4D97-AF65-F5344CB8AC3E}">
-        <p14:creationId xmlns:p14="http://schemas.microsoft.com/office/powerpoint/2010/main" val="2173985839"/>
+        <p14:creationId xmlns:p14="http://schemas.microsoft.com/office/powerpoint/2010/main" val="1767658799"/>
       </p:ext>
     </p:extLst>
   </p:cSld>
@@ -20559,7 +20560,7 @@
           <p:cNvPr id="2" name="Marcador de contenido 1">
             <a:extLst>
               <a:ext uri="{FF2B5EF4-FFF2-40B4-BE49-F238E27FC236}">
-                <a16:creationId xmlns:a16="http://schemas.microsoft.com/office/drawing/2014/main" id="{74DABB54-ECCB-467D-A4C3-8CC1A2C83017}"/>
+                <a16:creationId xmlns:a16="http://schemas.microsoft.com/office/drawing/2014/main" id="{6A35F60C-3920-4BF8-B6AA-2042C219580D}"/>
               </a:ext>
             </a:extLst>
           </p:cNvPr>
@@ -20584,7 +20585,7 @@
           <p:cNvPr id="3" name="Título 2">
             <a:extLst>
               <a:ext uri="{FF2B5EF4-FFF2-40B4-BE49-F238E27FC236}">
-                <a16:creationId xmlns:a16="http://schemas.microsoft.com/office/drawing/2014/main" id="{538E23A9-045D-45E3-A378-DBA7CCC63BF0}"/>
+                <a16:creationId xmlns:a16="http://schemas.microsoft.com/office/drawing/2014/main" id="{359DC2A4-3370-49AF-BC95-A4C49A7283D8}"/>
               </a:ext>
             </a:extLst>
           </p:cNvPr>
@@ -20609,7 +20610,7 @@
           <p:cNvPr id="4" name="Marcador de número de diapositiva 3">
             <a:extLst>
               <a:ext uri="{FF2B5EF4-FFF2-40B4-BE49-F238E27FC236}">
-                <a16:creationId xmlns:a16="http://schemas.microsoft.com/office/drawing/2014/main" id="{16541ECE-124A-485C-8BEF-D47E40B9AE90}"/>
+                <a16:creationId xmlns:a16="http://schemas.microsoft.com/office/drawing/2014/main" id="{BC3CDB0B-1415-40A2-8654-5B42CC679F2F}"/>
               </a:ext>
             </a:extLst>
           </p:cNvPr>
@@ -20643,7 +20644,7 @@
           <p:cNvPr id="5" name="Imagen 4">
             <a:extLst>
               <a:ext uri="{FF2B5EF4-FFF2-40B4-BE49-F238E27FC236}">
-                <a16:creationId xmlns:a16="http://schemas.microsoft.com/office/drawing/2014/main" id="{EB35E1D9-C14A-4BD3-BF76-E979A8C2DAE8}"/>
+                <a16:creationId xmlns:a16="http://schemas.microsoft.com/office/drawing/2014/main" id="{C4589494-C544-41C3-8680-1FFAC515B16B}"/>
               </a:ext>
             </a:extLst>
           </p:cNvPr>
@@ -20660,8 +20661,8 @@
         </p:blipFill>
         <p:spPr>
           <a:xfrm>
-            <a:off x="1104851" y="673564"/>
-            <a:ext cx="11641832" cy="5810250"/>
+            <a:off x="1896939" y="468263"/>
+            <a:ext cx="9734550" cy="6057900"/>
           </a:xfrm>
           <a:prstGeom prst="rect">
             <a:avLst/>
@@ -20671,7 +20672,7 @@
     </p:spTree>
     <p:extLst>
       <p:ext uri="{BB962C8B-B14F-4D97-AF65-F5344CB8AC3E}">
-        <p14:creationId xmlns:p14="http://schemas.microsoft.com/office/powerpoint/2010/main" val="831942589"/>
+        <p14:creationId xmlns:p14="http://schemas.microsoft.com/office/powerpoint/2010/main" val="2173985839"/>
       </p:ext>
     </p:extLst>
   </p:cSld>
@@ -20703,7 +20704,7 @@
           <p:cNvPr id="2" name="Marcador de contenido 1">
             <a:extLst>
               <a:ext uri="{FF2B5EF4-FFF2-40B4-BE49-F238E27FC236}">
-                <a16:creationId xmlns:a16="http://schemas.microsoft.com/office/drawing/2014/main" id="{21CC19F5-EF37-402B-A91B-18B05D5EBD9F}"/>
+                <a16:creationId xmlns:a16="http://schemas.microsoft.com/office/drawing/2014/main" id="{74DABB54-ECCB-467D-A4C3-8CC1A2C83017}"/>
               </a:ext>
             </a:extLst>
           </p:cNvPr>
@@ -20728,7 +20729,7 @@
           <p:cNvPr id="3" name="Título 2">
             <a:extLst>
               <a:ext uri="{FF2B5EF4-FFF2-40B4-BE49-F238E27FC236}">
-                <a16:creationId xmlns:a16="http://schemas.microsoft.com/office/drawing/2014/main" id="{DEAA74F9-CF4E-4DCF-8CD9-444B9793A46C}"/>
+                <a16:creationId xmlns:a16="http://schemas.microsoft.com/office/drawing/2014/main" id="{538E23A9-045D-45E3-A378-DBA7CCC63BF0}"/>
               </a:ext>
             </a:extLst>
           </p:cNvPr>
@@ -20744,7 +20745,7 @@
           <a:bodyPr/>
           <a:lstStyle/>
           <a:p>
-            <a:endParaRPr lang="es-ES" dirty="0"/>
+            <a:endParaRPr lang="es-ES"/>
           </a:p>
         </p:txBody>
       </p:sp>
@@ -20753,7 +20754,7 @@
           <p:cNvPr id="4" name="Marcador de número de diapositiva 3">
             <a:extLst>
               <a:ext uri="{FF2B5EF4-FFF2-40B4-BE49-F238E27FC236}">
-                <a16:creationId xmlns:a16="http://schemas.microsoft.com/office/drawing/2014/main" id="{30BF6A65-B6A3-4E2B-95E0-2B2800D2F015}"/>
+                <a16:creationId xmlns:a16="http://schemas.microsoft.com/office/drawing/2014/main" id="{16541ECE-124A-485C-8BEF-D47E40B9AE90}"/>
               </a:ext>
             </a:extLst>
           </p:cNvPr>
@@ -20787,7 +20788,7 @@
           <p:cNvPr id="5" name="Imagen 4">
             <a:extLst>
               <a:ext uri="{FF2B5EF4-FFF2-40B4-BE49-F238E27FC236}">
-                <a16:creationId xmlns:a16="http://schemas.microsoft.com/office/drawing/2014/main" id="{9BA71BA1-D13B-40C6-AEFC-9E1FC99929C2}"/>
+                <a16:creationId xmlns:a16="http://schemas.microsoft.com/office/drawing/2014/main" id="{EB35E1D9-C14A-4BD3-BF76-E979A8C2DAE8}"/>
               </a:ext>
             </a:extLst>
           </p:cNvPr>
@@ -20804,8 +20805,8 @@
         </p:blipFill>
         <p:spPr>
           <a:xfrm>
-            <a:off x="1392883" y="396255"/>
-            <a:ext cx="11161240" cy="6391275"/>
+            <a:off x="1104851" y="673564"/>
+            <a:ext cx="11641832" cy="5810250"/>
           </a:xfrm>
           <a:prstGeom prst="rect">
             <a:avLst/>
@@ -20815,7 +20816,7 @@
     </p:spTree>
     <p:extLst>
       <p:ext uri="{BB962C8B-B14F-4D97-AF65-F5344CB8AC3E}">
-        <p14:creationId xmlns:p14="http://schemas.microsoft.com/office/powerpoint/2010/main" val="2743042199"/>
+        <p14:creationId xmlns:p14="http://schemas.microsoft.com/office/powerpoint/2010/main" val="831942589"/>
       </p:ext>
     </p:extLst>
   </p:cSld>
@@ -20847,7 +20848,7 @@
           <p:cNvPr id="2" name="Marcador de contenido 1">
             <a:extLst>
               <a:ext uri="{FF2B5EF4-FFF2-40B4-BE49-F238E27FC236}">
-                <a16:creationId xmlns:a16="http://schemas.microsoft.com/office/drawing/2014/main" id="{5139B381-0FB7-4523-B8E5-2ABE36D3FEE6}"/>
+                <a16:creationId xmlns:a16="http://schemas.microsoft.com/office/drawing/2014/main" id="{21CC19F5-EF37-402B-A91B-18B05D5EBD9F}"/>
               </a:ext>
             </a:extLst>
           </p:cNvPr>
@@ -20863,7 +20864,7 @@
           <a:bodyPr/>
           <a:lstStyle/>
           <a:p>
-            <a:endParaRPr lang="es-ES" dirty="0"/>
+            <a:endParaRPr lang="es-ES"/>
           </a:p>
         </p:txBody>
       </p:sp>
@@ -20872,7 +20873,7 @@
           <p:cNvPr id="3" name="Título 2">
             <a:extLst>
               <a:ext uri="{FF2B5EF4-FFF2-40B4-BE49-F238E27FC236}">
-                <a16:creationId xmlns:a16="http://schemas.microsoft.com/office/drawing/2014/main" id="{2B35D04B-42C9-445B-ADD3-0A2ED18BF1BD}"/>
+                <a16:creationId xmlns:a16="http://schemas.microsoft.com/office/drawing/2014/main" id="{DEAA74F9-CF4E-4DCF-8CD9-444B9793A46C}"/>
               </a:ext>
             </a:extLst>
           </p:cNvPr>
@@ -20888,7 +20889,7 @@
           <a:bodyPr/>
           <a:lstStyle/>
           <a:p>
-            <a:endParaRPr lang="es-ES"/>
+            <a:endParaRPr lang="es-ES" dirty="0"/>
           </a:p>
         </p:txBody>
       </p:sp>
@@ -20897,7 +20898,7 @@
           <p:cNvPr id="4" name="Marcador de número de diapositiva 3">
             <a:extLst>
               <a:ext uri="{FF2B5EF4-FFF2-40B4-BE49-F238E27FC236}">
-                <a16:creationId xmlns:a16="http://schemas.microsoft.com/office/drawing/2014/main" id="{FF723495-4596-4B96-A221-3CCD2DF2CD39}"/>
+                <a16:creationId xmlns:a16="http://schemas.microsoft.com/office/drawing/2014/main" id="{30BF6A65-B6A3-4E2B-95E0-2B2800D2F015}"/>
               </a:ext>
             </a:extLst>
           </p:cNvPr>
@@ -20931,7 +20932,7 @@
           <p:cNvPr id="5" name="Imagen 4">
             <a:extLst>
               <a:ext uri="{FF2B5EF4-FFF2-40B4-BE49-F238E27FC236}">
-                <a16:creationId xmlns:a16="http://schemas.microsoft.com/office/drawing/2014/main" id="{A63349D2-263F-4DE7-8F6A-C27BFDFE9AED}"/>
+                <a16:creationId xmlns:a16="http://schemas.microsoft.com/office/drawing/2014/main" id="{9BA71BA1-D13B-40C6-AEFC-9E1FC99929C2}"/>
               </a:ext>
             </a:extLst>
           </p:cNvPr>
@@ -20948,8 +20949,8 @@
         </p:blipFill>
         <p:spPr>
           <a:xfrm>
-            <a:off x="1392883" y="356504"/>
-            <a:ext cx="11089232" cy="6315075"/>
+            <a:off x="1392883" y="396255"/>
+            <a:ext cx="11161240" cy="6391275"/>
           </a:xfrm>
           <a:prstGeom prst="rect">
             <a:avLst/>
@@ -20959,7 +20960,7 @@
     </p:spTree>
     <p:extLst>
       <p:ext uri="{BB962C8B-B14F-4D97-AF65-F5344CB8AC3E}">
-        <p14:creationId xmlns:p14="http://schemas.microsoft.com/office/powerpoint/2010/main" val="242950403"/>
+        <p14:creationId xmlns:p14="http://schemas.microsoft.com/office/powerpoint/2010/main" val="2743042199"/>
       </p:ext>
     </p:extLst>
   </p:cSld>
@@ -20991,7 +20992,7 @@
           <p:cNvPr id="2" name="Marcador de contenido 1">
             <a:extLst>
               <a:ext uri="{FF2B5EF4-FFF2-40B4-BE49-F238E27FC236}">
-                <a16:creationId xmlns:a16="http://schemas.microsoft.com/office/drawing/2014/main" id="{46AC8C10-97CC-4124-B66D-40F272B2C57E}"/>
+                <a16:creationId xmlns:a16="http://schemas.microsoft.com/office/drawing/2014/main" id="{5139B381-0FB7-4523-B8E5-2ABE36D3FEE6}"/>
               </a:ext>
             </a:extLst>
           </p:cNvPr>
@@ -21007,7 +21008,7 @@
           <a:bodyPr/>
           <a:lstStyle/>
           <a:p>
-            <a:endParaRPr lang="es-ES"/>
+            <a:endParaRPr lang="es-ES" dirty="0"/>
           </a:p>
         </p:txBody>
       </p:sp>
@@ -21016,7 +21017,7 @@
           <p:cNvPr id="3" name="Título 2">
             <a:extLst>
               <a:ext uri="{FF2B5EF4-FFF2-40B4-BE49-F238E27FC236}">
-                <a16:creationId xmlns:a16="http://schemas.microsoft.com/office/drawing/2014/main" id="{9225F2ED-E33C-4A99-9BEF-A5E7819F66F8}"/>
+                <a16:creationId xmlns:a16="http://schemas.microsoft.com/office/drawing/2014/main" id="{2B35D04B-42C9-445B-ADD3-0A2ED18BF1BD}"/>
               </a:ext>
             </a:extLst>
           </p:cNvPr>
@@ -21041,7 +21042,7 @@
           <p:cNvPr id="4" name="Marcador de número de diapositiva 3">
             <a:extLst>
               <a:ext uri="{FF2B5EF4-FFF2-40B4-BE49-F238E27FC236}">
-                <a16:creationId xmlns:a16="http://schemas.microsoft.com/office/drawing/2014/main" id="{DE2CAC21-040B-4080-BDA6-4A9F3EECBB4A}"/>
+                <a16:creationId xmlns:a16="http://schemas.microsoft.com/office/drawing/2014/main" id="{FF723495-4596-4B96-A221-3CCD2DF2CD39}"/>
               </a:ext>
             </a:extLst>
           </p:cNvPr>
@@ -21075,7 +21076,7 @@
           <p:cNvPr id="5" name="Imagen 4">
             <a:extLst>
               <a:ext uri="{FF2B5EF4-FFF2-40B4-BE49-F238E27FC236}">
-                <a16:creationId xmlns:a16="http://schemas.microsoft.com/office/drawing/2014/main" id="{670D4760-13C7-45C4-9DDF-AD6A1F19AC81}"/>
+                <a16:creationId xmlns:a16="http://schemas.microsoft.com/office/drawing/2014/main" id="{A63349D2-263F-4DE7-8F6A-C27BFDFE9AED}"/>
               </a:ext>
             </a:extLst>
           </p:cNvPr>
@@ -21092,8 +21093,8 @@
         </p:blipFill>
         <p:spPr>
           <a:xfrm>
-            <a:off x="1320875" y="468263"/>
-            <a:ext cx="10782300" cy="6000750"/>
+            <a:off x="1392883" y="356504"/>
+            <a:ext cx="11089232" cy="6315075"/>
           </a:xfrm>
           <a:prstGeom prst="rect">
             <a:avLst/>
@@ -21103,7 +21104,7 @@
     </p:spTree>
     <p:extLst>
       <p:ext uri="{BB962C8B-B14F-4D97-AF65-F5344CB8AC3E}">
-        <p14:creationId xmlns:p14="http://schemas.microsoft.com/office/powerpoint/2010/main" val="971065010"/>
+        <p14:creationId xmlns:p14="http://schemas.microsoft.com/office/powerpoint/2010/main" val="242950403"/>
       </p:ext>
     </p:extLst>
   </p:cSld>
@@ -21135,7 +21136,7 @@
           <p:cNvPr id="2" name="Marcador de contenido 1">
             <a:extLst>
               <a:ext uri="{FF2B5EF4-FFF2-40B4-BE49-F238E27FC236}">
-                <a16:creationId xmlns:a16="http://schemas.microsoft.com/office/drawing/2014/main" id="{0DBEEEF3-27A1-4B90-97D1-D7C84AEC276E}"/>
+                <a16:creationId xmlns:a16="http://schemas.microsoft.com/office/drawing/2014/main" id="{46AC8C10-97CC-4124-B66D-40F272B2C57E}"/>
               </a:ext>
             </a:extLst>
           </p:cNvPr>
@@ -21160,7 +21161,7 @@
           <p:cNvPr id="3" name="Título 2">
             <a:extLst>
               <a:ext uri="{FF2B5EF4-FFF2-40B4-BE49-F238E27FC236}">
-                <a16:creationId xmlns:a16="http://schemas.microsoft.com/office/drawing/2014/main" id="{206A4FE9-A0C6-49C0-827E-5D5F0A71DA35}"/>
+                <a16:creationId xmlns:a16="http://schemas.microsoft.com/office/drawing/2014/main" id="{9225F2ED-E33C-4A99-9BEF-A5E7819F66F8}"/>
               </a:ext>
             </a:extLst>
           </p:cNvPr>
@@ -21185,7 +21186,7 @@
           <p:cNvPr id="4" name="Marcador de número de diapositiva 3">
             <a:extLst>
               <a:ext uri="{FF2B5EF4-FFF2-40B4-BE49-F238E27FC236}">
-                <a16:creationId xmlns:a16="http://schemas.microsoft.com/office/drawing/2014/main" id="{66B04F7C-0A0A-43AF-AC44-D76C33F81183}"/>
+                <a16:creationId xmlns:a16="http://schemas.microsoft.com/office/drawing/2014/main" id="{DE2CAC21-040B-4080-BDA6-4A9F3EECBB4A}"/>
               </a:ext>
             </a:extLst>
           </p:cNvPr>
@@ -21219,7 +21220,7 @@
           <p:cNvPr id="5" name="Imagen 4">
             <a:extLst>
               <a:ext uri="{FF2B5EF4-FFF2-40B4-BE49-F238E27FC236}">
-                <a16:creationId xmlns:a16="http://schemas.microsoft.com/office/drawing/2014/main" id="{5DCA0ED9-E7CE-4835-B715-68BCF643838E}"/>
+                <a16:creationId xmlns:a16="http://schemas.microsoft.com/office/drawing/2014/main" id="{670D4760-13C7-45C4-9DDF-AD6A1F19AC81}"/>
               </a:ext>
             </a:extLst>
           </p:cNvPr>
@@ -21236,8 +21237,8 @@
         </p:blipFill>
         <p:spPr>
           <a:xfrm>
-            <a:off x="1176859" y="468263"/>
-            <a:ext cx="10945216" cy="5976664"/>
+            <a:off x="1320875" y="468263"/>
+            <a:ext cx="10782300" cy="6000750"/>
           </a:xfrm>
           <a:prstGeom prst="rect">
             <a:avLst/>
@@ -21247,7 +21248,7 @@
     </p:spTree>
     <p:extLst>
       <p:ext uri="{BB962C8B-B14F-4D97-AF65-F5344CB8AC3E}">
-        <p14:creationId xmlns:p14="http://schemas.microsoft.com/office/powerpoint/2010/main" val="992629192"/>
+        <p14:creationId xmlns:p14="http://schemas.microsoft.com/office/powerpoint/2010/main" val="971065010"/>
       </p:ext>
     </p:extLst>
   </p:cSld>
@@ -21276,10 +21277,35 @@
       </p:grpSpPr>
       <p:sp>
         <p:nvSpPr>
-          <p:cNvPr id="5" name="Título 4">
+          <p:cNvPr id="2" name="Marcador de contenido 1">
             <a:extLst>
               <a:ext uri="{FF2B5EF4-FFF2-40B4-BE49-F238E27FC236}">
-                <a16:creationId xmlns:a16="http://schemas.microsoft.com/office/drawing/2014/main" id="{08F6F1D2-3D4B-4E04-9329-2528487C2A14}"/>
+                <a16:creationId xmlns:a16="http://schemas.microsoft.com/office/drawing/2014/main" id="{0DBEEEF3-27A1-4B90-97D1-D7C84AEC276E}"/>
+              </a:ext>
+            </a:extLst>
+          </p:cNvPr>
+          <p:cNvSpPr>
+            <a:spLocks noGrp="1"/>
+          </p:cNvSpPr>
+          <p:nvPr>
+            <p:ph idx="1"/>
+          </p:nvPr>
+        </p:nvSpPr>
+        <p:spPr/>
+        <p:txBody>
+          <a:bodyPr/>
+          <a:lstStyle/>
+          <a:p>
+            <a:endParaRPr lang="es-ES"/>
+          </a:p>
+        </p:txBody>
+      </p:sp>
+      <p:sp>
+        <p:nvSpPr>
+          <p:cNvPr id="3" name="Título 2">
+            <a:extLst>
+              <a:ext uri="{FF2B5EF4-FFF2-40B4-BE49-F238E27FC236}">
+                <a16:creationId xmlns:a16="http://schemas.microsoft.com/office/drawing/2014/main" id="{206A4FE9-A0C6-49C0-827E-5D5F0A71DA35}"/>
               </a:ext>
             </a:extLst>
           </p:cNvPr>
@@ -21295,10 +21321,7 @@
           <a:bodyPr/>
           <a:lstStyle/>
           <a:p>
-            <a:r>
-              <a:rPr lang="es-ES" dirty="0"/>
-              <a:t>Como escribir mejores Funciones</a:t>
-            </a:r>
+            <a:endParaRPr lang="es-ES"/>
           </a:p>
         </p:txBody>
       </p:sp>
@@ -21307,7 +21330,7 @@
           <p:cNvPr id="4" name="Marcador de número de diapositiva 3">
             <a:extLst>
               <a:ext uri="{FF2B5EF4-FFF2-40B4-BE49-F238E27FC236}">
-                <a16:creationId xmlns:a16="http://schemas.microsoft.com/office/drawing/2014/main" id="{80182517-0211-4005-9D07-396179D444B0}"/>
+                <a16:creationId xmlns:a16="http://schemas.microsoft.com/office/drawing/2014/main" id="{66B04F7C-0A0A-43AF-AC44-D76C33F81183}"/>
               </a:ext>
             </a:extLst>
           </p:cNvPr>
@@ -21315,15 +21338,10 @@
             <a:spLocks noGrp="1"/>
           </p:cNvSpPr>
           <p:nvPr>
-            <p:ph type="sldNum" sz="quarter" idx="4294967295"/>
+            <p:ph type="sldNum" sz="quarter" idx="4"/>
           </p:nvPr>
         </p:nvSpPr>
-        <p:spPr>
-          <a:xfrm>
-            <a:off x="0" y="6897688"/>
-            <a:ext cx="661988" cy="468312"/>
-          </a:xfrm>
-        </p:spPr>
+        <p:spPr/>
         <p:txBody>
           <a:bodyPr/>
           <a:lstStyle/>
@@ -21341,10 +21359,40 @@
           </a:p>
         </p:txBody>
       </p:sp>
+      <p:pic>
+        <p:nvPicPr>
+          <p:cNvPr id="5" name="Imagen 4">
+            <a:extLst>
+              <a:ext uri="{FF2B5EF4-FFF2-40B4-BE49-F238E27FC236}">
+                <a16:creationId xmlns:a16="http://schemas.microsoft.com/office/drawing/2014/main" id="{5DCA0ED9-E7CE-4835-B715-68BCF643838E}"/>
+              </a:ext>
+            </a:extLst>
+          </p:cNvPr>
+          <p:cNvPicPr>
+            <a:picLocks noChangeAspect="1"/>
+          </p:cNvPicPr>
+          <p:nvPr/>
+        </p:nvPicPr>
+        <p:blipFill>
+          <a:blip r:embed="rId2"/>
+          <a:stretch>
+            <a:fillRect/>
+          </a:stretch>
+        </p:blipFill>
+        <p:spPr>
+          <a:xfrm>
+            <a:off x="1176859" y="468263"/>
+            <a:ext cx="10945216" cy="5976664"/>
+          </a:xfrm>
+          <a:prstGeom prst="rect">
+            <a:avLst/>
+          </a:prstGeom>
+        </p:spPr>
+      </p:pic>
     </p:spTree>
     <p:extLst>
       <p:ext uri="{BB962C8B-B14F-4D97-AF65-F5344CB8AC3E}">
-        <p14:creationId xmlns:p14="http://schemas.microsoft.com/office/powerpoint/2010/main" val="611402286"/>
+        <p14:creationId xmlns:p14="http://schemas.microsoft.com/office/powerpoint/2010/main" val="992629192"/>
       </p:ext>
     </p:extLst>
   </p:cSld>
@@ -21811,35 +21859,10 @@
       </p:grpSpPr>
       <p:sp>
         <p:nvSpPr>
-          <p:cNvPr id="4" name="Marcador de contenido 3">
+          <p:cNvPr id="5" name="Título 4">
             <a:extLst>
               <a:ext uri="{FF2B5EF4-FFF2-40B4-BE49-F238E27FC236}">
-                <a16:creationId xmlns:a16="http://schemas.microsoft.com/office/drawing/2014/main" id="{8ACEC584-5B0C-447A-9EC3-C3DBFC62AF57}"/>
-              </a:ext>
-            </a:extLst>
-          </p:cNvPr>
-          <p:cNvSpPr>
-            <a:spLocks noGrp="1"/>
-          </p:cNvSpPr>
-          <p:nvPr>
-            <p:ph idx="1"/>
-          </p:nvPr>
-        </p:nvSpPr>
-        <p:spPr/>
-        <p:txBody>
-          <a:bodyPr/>
-          <a:lstStyle/>
-          <a:p>
-            <a:endParaRPr lang="es-ES"/>
-          </a:p>
-        </p:txBody>
-      </p:sp>
-      <p:sp>
-        <p:nvSpPr>
-          <p:cNvPr id="3" name="Título 2">
-            <a:extLst>
-              <a:ext uri="{FF2B5EF4-FFF2-40B4-BE49-F238E27FC236}">
-                <a16:creationId xmlns:a16="http://schemas.microsoft.com/office/drawing/2014/main" id="{BD5E6892-705B-47B2-9AE1-C8BD0D3BACF1}"/>
+                <a16:creationId xmlns:a16="http://schemas.microsoft.com/office/drawing/2014/main" id="{08F6F1D2-3D4B-4E04-9329-2528487C2A14}"/>
               </a:ext>
             </a:extLst>
           </p:cNvPr>
@@ -21855,44 +21878,56 @@
           <a:bodyPr/>
           <a:lstStyle/>
           <a:p>
-            <a:endParaRPr lang="es-ES"/>
-          </a:p>
-        </p:txBody>
-      </p:sp>
-      <p:pic>
-        <p:nvPicPr>
-          <p:cNvPr id="5" name="Imagen 4">
+            <a:r>
+              <a:rPr lang="es-ES" dirty="0"/>
+              <a:t>Como escribir mejores Funciones</a:t>
+            </a:r>
+          </a:p>
+        </p:txBody>
+      </p:sp>
+      <p:sp>
+        <p:nvSpPr>
+          <p:cNvPr id="4" name="Marcador de número de diapositiva 3">
             <a:extLst>
               <a:ext uri="{FF2B5EF4-FFF2-40B4-BE49-F238E27FC236}">
-                <a16:creationId xmlns:a16="http://schemas.microsoft.com/office/drawing/2014/main" id="{4DAC0389-594F-4A29-9F61-B8E879037B86}"/>
+                <a16:creationId xmlns:a16="http://schemas.microsoft.com/office/drawing/2014/main" id="{80182517-0211-4005-9D07-396179D444B0}"/>
               </a:ext>
             </a:extLst>
           </p:cNvPr>
-          <p:cNvPicPr>
-            <a:picLocks noChangeAspect="1"/>
-          </p:cNvPicPr>
-          <p:nvPr/>
-        </p:nvPicPr>
-        <p:blipFill>
-          <a:blip r:embed="rId2"/>
-          <a:stretch>
-            <a:fillRect/>
-          </a:stretch>
-        </p:blipFill>
-        <p:spPr>
-          <a:xfrm>
-            <a:off x="1176859" y="1332359"/>
-            <a:ext cx="10982325" cy="3676650"/>
-          </a:xfrm>
-          <a:prstGeom prst="rect">
-            <a:avLst/>
-          </a:prstGeom>
-        </p:spPr>
-      </p:pic>
+          <p:cNvSpPr>
+            <a:spLocks noGrp="1"/>
+          </p:cNvSpPr>
+          <p:nvPr>
+            <p:ph type="sldNum" sz="quarter" idx="4294967295"/>
+          </p:nvPr>
+        </p:nvSpPr>
+        <p:spPr>
+          <a:xfrm>
+            <a:off x="0" y="6897688"/>
+            <a:ext cx="661988" cy="468312"/>
+          </a:xfrm>
+        </p:spPr>
+        <p:txBody>
+          <a:bodyPr/>
+          <a:lstStyle/>
+          <a:p>
+            <a:fld id="{C0C6E1E5-C711-49C2-AC1C-A8C0A200779D}" type="slidenum">
+              <a:rPr lang="es-ES" smtClean="0">
+                <a:cs typeface="Segoe UI Light" panose="020B0502040204020203" pitchFamily="34" charset="0"/>
+              </a:rPr>
+              <a:pPr/>
+              <a:t>20</a:t>
+            </a:fld>
+            <a:endParaRPr lang="es-ES" dirty="0">
+              <a:cs typeface="Segoe UI Light" panose="020B0502040204020203" pitchFamily="34" charset="0"/>
+            </a:endParaRPr>
+          </a:p>
+        </p:txBody>
+      </p:sp>
     </p:spTree>
     <p:extLst>
       <p:ext uri="{BB962C8B-B14F-4D97-AF65-F5344CB8AC3E}">
-        <p14:creationId xmlns:p14="http://schemas.microsoft.com/office/powerpoint/2010/main" val="3330546452"/>
+        <p14:creationId xmlns:p14="http://schemas.microsoft.com/office/powerpoint/2010/main" val="611402286"/>
       </p:ext>
     </p:extLst>
   </p:cSld>
@@ -21921,10 +21956,10 @@
       </p:grpSpPr>
       <p:sp>
         <p:nvSpPr>
-          <p:cNvPr id="2" name="Marcador de contenido 1">
+          <p:cNvPr id="4" name="Marcador de contenido 3">
             <a:extLst>
               <a:ext uri="{FF2B5EF4-FFF2-40B4-BE49-F238E27FC236}">
-                <a16:creationId xmlns:a16="http://schemas.microsoft.com/office/drawing/2014/main" id="{D7FCEAB1-CD91-460E-9877-3FD3529ECAB8}"/>
+                <a16:creationId xmlns:a16="http://schemas.microsoft.com/office/drawing/2014/main" id="{8ACEC584-5B0C-447A-9EC3-C3DBFC62AF57}"/>
               </a:ext>
             </a:extLst>
           </p:cNvPr>
@@ -21949,7 +21984,7 @@
           <p:cNvPr id="3" name="Título 2">
             <a:extLst>
               <a:ext uri="{FF2B5EF4-FFF2-40B4-BE49-F238E27FC236}">
-                <a16:creationId xmlns:a16="http://schemas.microsoft.com/office/drawing/2014/main" id="{BEAEC757-BB6C-40D6-A3D9-E77C880316DC}"/>
+                <a16:creationId xmlns:a16="http://schemas.microsoft.com/office/drawing/2014/main" id="{BD5E6892-705B-47B2-9AE1-C8BD0D3BACF1}"/>
               </a:ext>
             </a:extLst>
           </p:cNvPr>
@@ -21969,46 +22004,12 @@
           </a:p>
         </p:txBody>
       </p:sp>
-      <p:sp>
-        <p:nvSpPr>
-          <p:cNvPr id="4" name="Marcador de número de diapositiva 3">
-            <a:extLst>
-              <a:ext uri="{FF2B5EF4-FFF2-40B4-BE49-F238E27FC236}">
-                <a16:creationId xmlns:a16="http://schemas.microsoft.com/office/drawing/2014/main" id="{678C66E7-D6B8-490C-8BDC-8B61E413233A}"/>
-              </a:ext>
-            </a:extLst>
-          </p:cNvPr>
-          <p:cNvSpPr>
-            <a:spLocks noGrp="1"/>
-          </p:cNvSpPr>
-          <p:nvPr>
-            <p:ph type="sldNum" sz="quarter" idx="4"/>
-          </p:nvPr>
-        </p:nvSpPr>
-        <p:spPr/>
-        <p:txBody>
-          <a:bodyPr/>
-          <a:lstStyle/>
-          <a:p>
-            <a:fld id="{C0C6E1E5-C711-49C2-AC1C-A8C0A200779D}" type="slidenum">
-              <a:rPr lang="es-ES" smtClean="0">
-                <a:cs typeface="Segoe UI Light" panose="020B0502040204020203" pitchFamily="34" charset="0"/>
-              </a:rPr>
-              <a:pPr/>
-              <a:t>21</a:t>
-            </a:fld>
-            <a:endParaRPr lang="es-ES" dirty="0">
-              <a:cs typeface="Segoe UI Light" panose="020B0502040204020203" pitchFamily="34" charset="0"/>
-            </a:endParaRPr>
-          </a:p>
-        </p:txBody>
-      </p:sp>
       <p:pic>
         <p:nvPicPr>
           <p:cNvPr id="5" name="Imagen 4">
             <a:extLst>
               <a:ext uri="{FF2B5EF4-FFF2-40B4-BE49-F238E27FC236}">
-                <a16:creationId xmlns:a16="http://schemas.microsoft.com/office/drawing/2014/main" id="{C3D7AE5D-B1E0-4167-B68B-DF29DCF68FBC}"/>
+                <a16:creationId xmlns:a16="http://schemas.microsoft.com/office/drawing/2014/main" id="{4DAC0389-594F-4A29-9F61-B8E879037B86}"/>
               </a:ext>
             </a:extLst>
           </p:cNvPr>
@@ -22025,8 +22026,8 @@
         </p:blipFill>
         <p:spPr>
           <a:xfrm>
-            <a:off x="952236" y="900311"/>
-            <a:ext cx="11830050" cy="5648325"/>
+            <a:off x="1176859" y="1332359"/>
+            <a:ext cx="10982325" cy="3676650"/>
           </a:xfrm>
           <a:prstGeom prst="rect">
             <a:avLst/>
@@ -22036,7 +22037,7 @@
     </p:spTree>
     <p:extLst>
       <p:ext uri="{BB962C8B-B14F-4D97-AF65-F5344CB8AC3E}">
-        <p14:creationId xmlns:p14="http://schemas.microsoft.com/office/powerpoint/2010/main" val="1810950228"/>
+        <p14:creationId xmlns:p14="http://schemas.microsoft.com/office/powerpoint/2010/main" val="3330546452"/>
       </p:ext>
     </p:extLst>
   </p:cSld>
@@ -22068,7 +22069,7 @@
           <p:cNvPr id="2" name="Marcador de contenido 1">
             <a:extLst>
               <a:ext uri="{FF2B5EF4-FFF2-40B4-BE49-F238E27FC236}">
-                <a16:creationId xmlns:a16="http://schemas.microsoft.com/office/drawing/2014/main" id="{BEED194C-F330-44A9-AA65-E7C58962E66E}"/>
+                <a16:creationId xmlns:a16="http://schemas.microsoft.com/office/drawing/2014/main" id="{D7FCEAB1-CD91-460E-9877-3FD3529ECAB8}"/>
               </a:ext>
             </a:extLst>
           </p:cNvPr>
@@ -22093,7 +22094,7 @@
           <p:cNvPr id="3" name="Título 2">
             <a:extLst>
               <a:ext uri="{FF2B5EF4-FFF2-40B4-BE49-F238E27FC236}">
-                <a16:creationId xmlns:a16="http://schemas.microsoft.com/office/drawing/2014/main" id="{D35A1455-4E43-4F7C-A917-83D0FFB1BA5C}"/>
+                <a16:creationId xmlns:a16="http://schemas.microsoft.com/office/drawing/2014/main" id="{BEAEC757-BB6C-40D6-A3D9-E77C880316DC}"/>
               </a:ext>
             </a:extLst>
           </p:cNvPr>
@@ -22118,7 +22119,7 @@
           <p:cNvPr id="4" name="Marcador de número de diapositiva 3">
             <a:extLst>
               <a:ext uri="{FF2B5EF4-FFF2-40B4-BE49-F238E27FC236}">
-                <a16:creationId xmlns:a16="http://schemas.microsoft.com/office/drawing/2014/main" id="{E2EA4C51-7CFD-481E-846A-3A1F5F3F38B4}"/>
+                <a16:creationId xmlns:a16="http://schemas.microsoft.com/office/drawing/2014/main" id="{678C66E7-D6B8-490C-8BDC-8B61E413233A}"/>
               </a:ext>
             </a:extLst>
           </p:cNvPr>
@@ -22152,7 +22153,7 @@
           <p:cNvPr id="5" name="Imagen 4">
             <a:extLst>
               <a:ext uri="{FF2B5EF4-FFF2-40B4-BE49-F238E27FC236}">
-                <a16:creationId xmlns:a16="http://schemas.microsoft.com/office/drawing/2014/main" id="{D4983739-5598-4E4E-AAF0-CED43B813C56}"/>
+                <a16:creationId xmlns:a16="http://schemas.microsoft.com/office/drawing/2014/main" id="{C3D7AE5D-B1E0-4167-B68B-DF29DCF68FBC}"/>
               </a:ext>
             </a:extLst>
           </p:cNvPr>
@@ -22169,8 +22170,8 @@
         </p:blipFill>
         <p:spPr>
           <a:xfrm>
-            <a:off x="565904" y="665373"/>
-            <a:ext cx="12011025" cy="5305425"/>
+            <a:off x="952236" y="900311"/>
+            <a:ext cx="11830050" cy="5648325"/>
           </a:xfrm>
           <a:prstGeom prst="rect">
             <a:avLst/>
@@ -22180,7 +22181,7 @@
     </p:spTree>
     <p:extLst>
       <p:ext uri="{BB962C8B-B14F-4D97-AF65-F5344CB8AC3E}">
-        <p14:creationId xmlns:p14="http://schemas.microsoft.com/office/powerpoint/2010/main" val="2233412654"/>
+        <p14:creationId xmlns:p14="http://schemas.microsoft.com/office/powerpoint/2010/main" val="1810950228"/>
       </p:ext>
     </p:extLst>
   </p:cSld>
@@ -22212,7 +22213,7 @@
           <p:cNvPr id="2" name="Marcador de contenido 1">
             <a:extLst>
               <a:ext uri="{FF2B5EF4-FFF2-40B4-BE49-F238E27FC236}">
-                <a16:creationId xmlns:a16="http://schemas.microsoft.com/office/drawing/2014/main" id="{F3D0A52A-8495-401B-9EC4-BF2472FF8236}"/>
+                <a16:creationId xmlns:a16="http://schemas.microsoft.com/office/drawing/2014/main" id="{BEED194C-F330-44A9-AA65-E7C58962E66E}"/>
               </a:ext>
             </a:extLst>
           </p:cNvPr>
@@ -22228,7 +22229,7 @@
           <a:bodyPr/>
           <a:lstStyle/>
           <a:p>
-            <a:endParaRPr lang="es-ES" dirty="0"/>
+            <a:endParaRPr lang="es-ES"/>
           </a:p>
         </p:txBody>
       </p:sp>
@@ -22237,7 +22238,7 @@
           <p:cNvPr id="3" name="Título 2">
             <a:extLst>
               <a:ext uri="{FF2B5EF4-FFF2-40B4-BE49-F238E27FC236}">
-                <a16:creationId xmlns:a16="http://schemas.microsoft.com/office/drawing/2014/main" id="{F3E10521-BD9E-4331-86EE-DB3EC04A4B38}"/>
+                <a16:creationId xmlns:a16="http://schemas.microsoft.com/office/drawing/2014/main" id="{D35A1455-4E43-4F7C-A917-83D0FFB1BA5C}"/>
               </a:ext>
             </a:extLst>
           </p:cNvPr>
@@ -22262,7 +22263,7 @@
           <p:cNvPr id="4" name="Marcador de número de diapositiva 3">
             <a:extLst>
               <a:ext uri="{FF2B5EF4-FFF2-40B4-BE49-F238E27FC236}">
-                <a16:creationId xmlns:a16="http://schemas.microsoft.com/office/drawing/2014/main" id="{5EB8656F-A10A-43ED-AA92-6633663469F8}"/>
+                <a16:creationId xmlns:a16="http://schemas.microsoft.com/office/drawing/2014/main" id="{E2EA4C51-7CFD-481E-846A-3A1F5F3F38B4}"/>
               </a:ext>
             </a:extLst>
           </p:cNvPr>
@@ -22296,7 +22297,7 @@
           <p:cNvPr id="5" name="Imagen 4">
             <a:extLst>
               <a:ext uri="{FF2B5EF4-FFF2-40B4-BE49-F238E27FC236}">
-                <a16:creationId xmlns:a16="http://schemas.microsoft.com/office/drawing/2014/main" id="{7A7198CC-278B-4660-856B-28CD24531994}"/>
+                <a16:creationId xmlns:a16="http://schemas.microsoft.com/office/drawing/2014/main" id="{D4983739-5598-4E4E-AAF0-CED43B813C56}"/>
               </a:ext>
             </a:extLst>
           </p:cNvPr>
@@ -22313,8 +22314,8 @@
         </p:blipFill>
         <p:spPr>
           <a:xfrm>
-            <a:off x="1229462" y="302801"/>
-            <a:ext cx="10953750" cy="6257925"/>
+            <a:off x="565904" y="665373"/>
+            <a:ext cx="12011025" cy="5305425"/>
           </a:xfrm>
           <a:prstGeom prst="rect">
             <a:avLst/>
@@ -22324,7 +22325,7 @@
     </p:spTree>
     <p:extLst>
       <p:ext uri="{BB962C8B-B14F-4D97-AF65-F5344CB8AC3E}">
-        <p14:creationId xmlns:p14="http://schemas.microsoft.com/office/powerpoint/2010/main" val="3166421142"/>
+        <p14:creationId xmlns:p14="http://schemas.microsoft.com/office/powerpoint/2010/main" val="2233412654"/>
       </p:ext>
     </p:extLst>
   </p:cSld>
@@ -22356,7 +22357,7 @@
           <p:cNvPr id="2" name="Marcador de contenido 1">
             <a:extLst>
               <a:ext uri="{FF2B5EF4-FFF2-40B4-BE49-F238E27FC236}">
-                <a16:creationId xmlns:a16="http://schemas.microsoft.com/office/drawing/2014/main" id="{92FEF2DC-9F22-4C39-9947-012FFE01AC21}"/>
+                <a16:creationId xmlns:a16="http://schemas.microsoft.com/office/drawing/2014/main" id="{F3D0A52A-8495-401B-9EC4-BF2472FF8236}"/>
               </a:ext>
             </a:extLst>
           </p:cNvPr>
@@ -22372,7 +22373,7 @@
           <a:bodyPr/>
           <a:lstStyle/>
           <a:p>
-            <a:endParaRPr lang="es-ES"/>
+            <a:endParaRPr lang="es-ES" dirty="0"/>
           </a:p>
         </p:txBody>
       </p:sp>
@@ -22381,7 +22382,7 @@
           <p:cNvPr id="3" name="Título 2">
             <a:extLst>
               <a:ext uri="{FF2B5EF4-FFF2-40B4-BE49-F238E27FC236}">
-                <a16:creationId xmlns:a16="http://schemas.microsoft.com/office/drawing/2014/main" id="{9BCF8CD9-A7C9-4D57-8E87-F7AFEF06EF84}"/>
+                <a16:creationId xmlns:a16="http://schemas.microsoft.com/office/drawing/2014/main" id="{F3E10521-BD9E-4331-86EE-DB3EC04A4B38}"/>
               </a:ext>
             </a:extLst>
           </p:cNvPr>
@@ -22406,7 +22407,7 @@
           <p:cNvPr id="4" name="Marcador de número de diapositiva 3">
             <a:extLst>
               <a:ext uri="{FF2B5EF4-FFF2-40B4-BE49-F238E27FC236}">
-                <a16:creationId xmlns:a16="http://schemas.microsoft.com/office/drawing/2014/main" id="{C6B75308-F7A6-4255-B562-66EFC5DF547F}"/>
+                <a16:creationId xmlns:a16="http://schemas.microsoft.com/office/drawing/2014/main" id="{5EB8656F-A10A-43ED-AA92-6633663469F8}"/>
               </a:ext>
             </a:extLst>
           </p:cNvPr>
@@ -22440,7 +22441,7 @@
           <p:cNvPr id="5" name="Imagen 4">
             <a:extLst>
               <a:ext uri="{FF2B5EF4-FFF2-40B4-BE49-F238E27FC236}">
-                <a16:creationId xmlns:a16="http://schemas.microsoft.com/office/drawing/2014/main" id="{4A87CC77-3855-400F-AF67-A61C469F22D2}"/>
+                <a16:creationId xmlns:a16="http://schemas.microsoft.com/office/drawing/2014/main" id="{7A7198CC-278B-4660-856B-28CD24531994}"/>
               </a:ext>
             </a:extLst>
           </p:cNvPr>
@@ -22457,8 +22458,8 @@
         </p:blipFill>
         <p:spPr>
           <a:xfrm>
-            <a:off x="1104851" y="612279"/>
-            <a:ext cx="11377264" cy="5762625"/>
+            <a:off x="1229462" y="302801"/>
+            <a:ext cx="10953750" cy="6257925"/>
           </a:xfrm>
           <a:prstGeom prst="rect">
             <a:avLst/>
@@ -22468,7 +22469,7 @@
     </p:spTree>
     <p:extLst>
       <p:ext uri="{BB962C8B-B14F-4D97-AF65-F5344CB8AC3E}">
-        <p14:creationId xmlns:p14="http://schemas.microsoft.com/office/powerpoint/2010/main" val="2670785976"/>
+        <p14:creationId xmlns:p14="http://schemas.microsoft.com/office/powerpoint/2010/main" val="3166421142"/>
       </p:ext>
     </p:extLst>
   </p:cSld>
@@ -22497,10 +22498,35 @@
       </p:grpSpPr>
       <p:sp>
         <p:nvSpPr>
-          <p:cNvPr id="5" name="Título 4">
+          <p:cNvPr id="2" name="Marcador de contenido 1">
             <a:extLst>
               <a:ext uri="{FF2B5EF4-FFF2-40B4-BE49-F238E27FC236}">
-                <a16:creationId xmlns:a16="http://schemas.microsoft.com/office/drawing/2014/main" id="{E9F89323-07B2-42EC-B818-F1DB87F4262B}"/>
+                <a16:creationId xmlns:a16="http://schemas.microsoft.com/office/drawing/2014/main" id="{92FEF2DC-9F22-4C39-9947-012FFE01AC21}"/>
+              </a:ext>
+            </a:extLst>
+          </p:cNvPr>
+          <p:cNvSpPr>
+            <a:spLocks noGrp="1"/>
+          </p:cNvSpPr>
+          <p:nvPr>
+            <p:ph idx="1"/>
+          </p:nvPr>
+        </p:nvSpPr>
+        <p:spPr/>
+        <p:txBody>
+          <a:bodyPr/>
+          <a:lstStyle/>
+          <a:p>
+            <a:endParaRPr lang="es-ES"/>
+          </a:p>
+        </p:txBody>
+      </p:sp>
+      <p:sp>
+        <p:nvSpPr>
+          <p:cNvPr id="3" name="Título 2">
+            <a:extLst>
+              <a:ext uri="{FF2B5EF4-FFF2-40B4-BE49-F238E27FC236}">
+                <a16:creationId xmlns:a16="http://schemas.microsoft.com/office/drawing/2014/main" id="{9BCF8CD9-A7C9-4D57-8E87-F7AFEF06EF84}"/>
               </a:ext>
             </a:extLst>
           </p:cNvPr>
@@ -22516,10 +22542,7 @@
           <a:bodyPr/>
           <a:lstStyle/>
           <a:p>
-            <a:r>
-              <a:rPr lang="es-ES" dirty="0"/>
-              <a:t>Interfaces vs Clases</a:t>
-            </a:r>
+            <a:endParaRPr lang="es-ES"/>
           </a:p>
         </p:txBody>
       </p:sp>
@@ -22528,7 +22551,7 @@
           <p:cNvPr id="4" name="Marcador de número de diapositiva 3">
             <a:extLst>
               <a:ext uri="{FF2B5EF4-FFF2-40B4-BE49-F238E27FC236}">
-                <a16:creationId xmlns:a16="http://schemas.microsoft.com/office/drawing/2014/main" id="{B7C4F303-9FCF-44DB-9CEB-C4CA9D79652A}"/>
+                <a16:creationId xmlns:a16="http://schemas.microsoft.com/office/drawing/2014/main" id="{C6B75308-F7A6-4255-B562-66EFC5DF547F}"/>
               </a:ext>
             </a:extLst>
           </p:cNvPr>
@@ -22536,15 +22559,10 @@
             <a:spLocks noGrp="1"/>
           </p:cNvSpPr>
           <p:nvPr>
-            <p:ph type="sldNum" sz="quarter" idx="4294967295"/>
+            <p:ph type="sldNum" sz="quarter" idx="4"/>
           </p:nvPr>
         </p:nvSpPr>
-        <p:spPr>
-          <a:xfrm>
-            <a:off x="0" y="6897688"/>
-            <a:ext cx="661988" cy="468312"/>
-          </a:xfrm>
-        </p:spPr>
+        <p:spPr/>
         <p:txBody>
           <a:bodyPr/>
           <a:lstStyle/>
@@ -22562,10 +22580,40 @@
           </a:p>
         </p:txBody>
       </p:sp>
+      <p:pic>
+        <p:nvPicPr>
+          <p:cNvPr id="5" name="Imagen 4">
+            <a:extLst>
+              <a:ext uri="{FF2B5EF4-FFF2-40B4-BE49-F238E27FC236}">
+                <a16:creationId xmlns:a16="http://schemas.microsoft.com/office/drawing/2014/main" id="{4A87CC77-3855-400F-AF67-A61C469F22D2}"/>
+              </a:ext>
+            </a:extLst>
+          </p:cNvPr>
+          <p:cNvPicPr>
+            <a:picLocks noChangeAspect="1"/>
+          </p:cNvPicPr>
+          <p:nvPr/>
+        </p:nvPicPr>
+        <p:blipFill>
+          <a:blip r:embed="rId2"/>
+          <a:stretch>
+            <a:fillRect/>
+          </a:stretch>
+        </p:blipFill>
+        <p:spPr>
+          <a:xfrm>
+            <a:off x="1104851" y="612279"/>
+            <a:ext cx="11377264" cy="5762625"/>
+          </a:xfrm>
+          <a:prstGeom prst="rect">
+            <a:avLst/>
+          </a:prstGeom>
+        </p:spPr>
+      </p:pic>
     </p:spTree>
     <p:extLst>
       <p:ext uri="{BB962C8B-B14F-4D97-AF65-F5344CB8AC3E}">
-        <p14:creationId xmlns:p14="http://schemas.microsoft.com/office/powerpoint/2010/main" val="1808898301"/>
+        <p14:creationId xmlns:p14="http://schemas.microsoft.com/office/powerpoint/2010/main" val="2670785976"/>
       </p:ext>
     </p:extLst>
   </p:cSld>
@@ -22594,35 +22642,10 @@
       </p:grpSpPr>
       <p:sp>
         <p:nvSpPr>
-          <p:cNvPr id="4" name="Marcador de contenido 3">
+          <p:cNvPr id="5" name="Título 4">
             <a:extLst>
               <a:ext uri="{FF2B5EF4-FFF2-40B4-BE49-F238E27FC236}">
-                <a16:creationId xmlns:a16="http://schemas.microsoft.com/office/drawing/2014/main" id="{5F19EA2E-AE47-4F02-9D6E-B85C68D5C60E}"/>
-              </a:ext>
-            </a:extLst>
-          </p:cNvPr>
-          <p:cNvSpPr>
-            <a:spLocks noGrp="1"/>
-          </p:cNvSpPr>
-          <p:nvPr>
-            <p:ph idx="1"/>
-          </p:nvPr>
-        </p:nvSpPr>
-        <p:spPr/>
-        <p:txBody>
-          <a:bodyPr/>
-          <a:lstStyle/>
-          <a:p>
-            <a:endParaRPr lang="es-ES"/>
-          </a:p>
-        </p:txBody>
-      </p:sp>
-      <p:sp>
-        <p:nvSpPr>
-          <p:cNvPr id="3" name="Título 2">
-            <a:extLst>
-              <a:ext uri="{FF2B5EF4-FFF2-40B4-BE49-F238E27FC236}">
-                <a16:creationId xmlns:a16="http://schemas.microsoft.com/office/drawing/2014/main" id="{29213AD7-4EA5-4D8E-BE8E-37411010BEA7}"/>
+                <a16:creationId xmlns:a16="http://schemas.microsoft.com/office/drawing/2014/main" id="{E9F89323-07B2-42EC-B818-F1DB87F4262B}"/>
               </a:ext>
             </a:extLst>
           </p:cNvPr>
@@ -22638,44 +22661,56 @@
           <a:bodyPr/>
           <a:lstStyle/>
           <a:p>
-            <a:endParaRPr lang="es-ES"/>
-          </a:p>
-        </p:txBody>
-      </p:sp>
-      <p:pic>
-        <p:nvPicPr>
-          <p:cNvPr id="5" name="Imagen 4">
+            <a:r>
+              <a:rPr lang="es-ES" dirty="0"/>
+              <a:t>Interfaces vs Clases</a:t>
+            </a:r>
+          </a:p>
+        </p:txBody>
+      </p:sp>
+      <p:sp>
+        <p:nvSpPr>
+          <p:cNvPr id="4" name="Marcador de número de diapositiva 3">
             <a:extLst>
               <a:ext uri="{FF2B5EF4-FFF2-40B4-BE49-F238E27FC236}">
-                <a16:creationId xmlns:a16="http://schemas.microsoft.com/office/drawing/2014/main" id="{66D7C26F-28CB-40EE-BAED-CADA7B2152E6}"/>
+                <a16:creationId xmlns:a16="http://schemas.microsoft.com/office/drawing/2014/main" id="{B7C4F303-9FCF-44DB-9CEB-C4CA9D79652A}"/>
               </a:ext>
             </a:extLst>
           </p:cNvPr>
-          <p:cNvPicPr>
-            <a:picLocks noChangeAspect="1"/>
-          </p:cNvPicPr>
-          <p:nvPr/>
-        </p:nvPicPr>
-        <p:blipFill>
-          <a:blip r:embed="rId2"/>
-          <a:stretch>
-            <a:fillRect/>
-          </a:stretch>
-        </p:blipFill>
-        <p:spPr>
-          <a:xfrm>
-            <a:off x="888827" y="396255"/>
-            <a:ext cx="11429231" cy="6134100"/>
-          </a:xfrm>
-          <a:prstGeom prst="rect">
-            <a:avLst/>
-          </a:prstGeom>
-        </p:spPr>
-      </p:pic>
+          <p:cNvSpPr>
+            <a:spLocks noGrp="1"/>
+          </p:cNvSpPr>
+          <p:nvPr>
+            <p:ph type="sldNum" sz="quarter" idx="4294967295"/>
+          </p:nvPr>
+        </p:nvSpPr>
+        <p:spPr>
+          <a:xfrm>
+            <a:off x="0" y="6897688"/>
+            <a:ext cx="661988" cy="468312"/>
+          </a:xfrm>
+        </p:spPr>
+        <p:txBody>
+          <a:bodyPr/>
+          <a:lstStyle/>
+          <a:p>
+            <a:fld id="{C0C6E1E5-C711-49C2-AC1C-A8C0A200779D}" type="slidenum">
+              <a:rPr lang="es-ES" smtClean="0">
+                <a:cs typeface="Segoe UI Light" panose="020B0502040204020203" pitchFamily="34" charset="0"/>
+              </a:rPr>
+              <a:pPr/>
+              <a:t>26</a:t>
+            </a:fld>
+            <a:endParaRPr lang="es-ES" dirty="0">
+              <a:cs typeface="Segoe UI Light" panose="020B0502040204020203" pitchFamily="34" charset="0"/>
+            </a:endParaRPr>
+          </a:p>
+        </p:txBody>
+      </p:sp>
     </p:spTree>
     <p:extLst>
       <p:ext uri="{BB962C8B-B14F-4D97-AF65-F5344CB8AC3E}">
-        <p14:creationId xmlns:p14="http://schemas.microsoft.com/office/powerpoint/2010/main" val="3347650386"/>
+        <p14:creationId xmlns:p14="http://schemas.microsoft.com/office/powerpoint/2010/main" val="1808898301"/>
       </p:ext>
     </p:extLst>
   </p:cSld>
@@ -22704,10 +22739,10 @@
       </p:grpSpPr>
       <p:sp>
         <p:nvSpPr>
-          <p:cNvPr id="2" name="Marcador de contenido 1">
+          <p:cNvPr id="4" name="Marcador de contenido 3">
             <a:extLst>
               <a:ext uri="{FF2B5EF4-FFF2-40B4-BE49-F238E27FC236}">
-                <a16:creationId xmlns:a16="http://schemas.microsoft.com/office/drawing/2014/main" id="{068DBEA2-8CE1-42EF-88C1-0F952BEC6E47}"/>
+                <a16:creationId xmlns:a16="http://schemas.microsoft.com/office/drawing/2014/main" id="{5F19EA2E-AE47-4F02-9D6E-B85C68D5C60E}"/>
               </a:ext>
             </a:extLst>
           </p:cNvPr>
@@ -22732,7 +22767,7 @@
           <p:cNvPr id="3" name="Título 2">
             <a:extLst>
               <a:ext uri="{FF2B5EF4-FFF2-40B4-BE49-F238E27FC236}">
-                <a16:creationId xmlns:a16="http://schemas.microsoft.com/office/drawing/2014/main" id="{CDBF152A-E8FA-456B-8A9B-CBC9FE26E9E3}"/>
+                <a16:creationId xmlns:a16="http://schemas.microsoft.com/office/drawing/2014/main" id="{29213AD7-4EA5-4D8E-BE8E-37411010BEA7}"/>
               </a:ext>
             </a:extLst>
           </p:cNvPr>
@@ -22752,46 +22787,12 @@
           </a:p>
         </p:txBody>
       </p:sp>
-      <p:sp>
-        <p:nvSpPr>
-          <p:cNvPr id="4" name="Marcador de número de diapositiva 3">
-            <a:extLst>
-              <a:ext uri="{FF2B5EF4-FFF2-40B4-BE49-F238E27FC236}">
-                <a16:creationId xmlns:a16="http://schemas.microsoft.com/office/drawing/2014/main" id="{20A443A0-0C68-4490-BAFF-36369D47A74E}"/>
-              </a:ext>
-            </a:extLst>
-          </p:cNvPr>
-          <p:cNvSpPr>
-            <a:spLocks noGrp="1"/>
-          </p:cNvSpPr>
-          <p:nvPr>
-            <p:ph type="sldNum" sz="quarter" idx="4"/>
-          </p:nvPr>
-        </p:nvSpPr>
-        <p:spPr/>
-        <p:txBody>
-          <a:bodyPr/>
-          <a:lstStyle/>
-          <a:p>
-            <a:fld id="{C0C6E1E5-C711-49C2-AC1C-A8C0A200779D}" type="slidenum">
-              <a:rPr lang="es-ES" smtClean="0">
-                <a:cs typeface="Segoe UI Light" panose="020B0502040204020203" pitchFamily="34" charset="0"/>
-              </a:rPr>
-              <a:pPr/>
-              <a:t>27</a:t>
-            </a:fld>
-            <a:endParaRPr lang="es-ES" dirty="0">
-              <a:cs typeface="Segoe UI Light" panose="020B0502040204020203" pitchFamily="34" charset="0"/>
-            </a:endParaRPr>
-          </a:p>
-        </p:txBody>
-      </p:sp>
       <p:pic>
         <p:nvPicPr>
           <p:cNvPr id="5" name="Imagen 4">
             <a:extLst>
               <a:ext uri="{FF2B5EF4-FFF2-40B4-BE49-F238E27FC236}">
-                <a16:creationId xmlns:a16="http://schemas.microsoft.com/office/drawing/2014/main" id="{87EB2C19-997B-407E-84B6-0931528FAB89}"/>
+                <a16:creationId xmlns:a16="http://schemas.microsoft.com/office/drawing/2014/main" id="{66D7C26F-28CB-40EE-BAED-CADA7B2152E6}"/>
               </a:ext>
             </a:extLst>
           </p:cNvPr>
@@ -22808,8 +22809,8 @@
         </p:blipFill>
         <p:spPr>
           <a:xfrm>
-            <a:off x="1032843" y="540271"/>
-            <a:ext cx="11521280" cy="5724525"/>
+            <a:off x="888827" y="396255"/>
+            <a:ext cx="11429231" cy="6134100"/>
           </a:xfrm>
           <a:prstGeom prst="rect">
             <a:avLst/>
@@ -22819,7 +22820,7 @@
     </p:spTree>
     <p:extLst>
       <p:ext uri="{BB962C8B-B14F-4D97-AF65-F5344CB8AC3E}">
-        <p14:creationId xmlns:p14="http://schemas.microsoft.com/office/powerpoint/2010/main" val="2125145163"/>
+        <p14:creationId xmlns:p14="http://schemas.microsoft.com/office/powerpoint/2010/main" val="3347650386"/>
       </p:ext>
     </p:extLst>
   </p:cSld>
@@ -22851,7 +22852,7 @@
           <p:cNvPr id="2" name="Marcador de contenido 1">
             <a:extLst>
               <a:ext uri="{FF2B5EF4-FFF2-40B4-BE49-F238E27FC236}">
-                <a16:creationId xmlns:a16="http://schemas.microsoft.com/office/drawing/2014/main" id="{A1BF1E6A-2AAA-4E56-98F5-1E10D5BCB15E}"/>
+                <a16:creationId xmlns:a16="http://schemas.microsoft.com/office/drawing/2014/main" id="{068DBEA2-8CE1-42EF-88C1-0F952BEC6E47}"/>
               </a:ext>
             </a:extLst>
           </p:cNvPr>
@@ -22876,7 +22877,7 @@
           <p:cNvPr id="3" name="Título 2">
             <a:extLst>
               <a:ext uri="{FF2B5EF4-FFF2-40B4-BE49-F238E27FC236}">
-                <a16:creationId xmlns:a16="http://schemas.microsoft.com/office/drawing/2014/main" id="{D7719DE4-60D3-47AE-A545-2EA62D105DEE}"/>
+                <a16:creationId xmlns:a16="http://schemas.microsoft.com/office/drawing/2014/main" id="{CDBF152A-E8FA-456B-8A9B-CBC9FE26E9E3}"/>
               </a:ext>
             </a:extLst>
           </p:cNvPr>
@@ -22901,7 +22902,7 @@
           <p:cNvPr id="4" name="Marcador de número de diapositiva 3">
             <a:extLst>
               <a:ext uri="{FF2B5EF4-FFF2-40B4-BE49-F238E27FC236}">
-                <a16:creationId xmlns:a16="http://schemas.microsoft.com/office/drawing/2014/main" id="{0DE7B444-DE5E-4595-82D3-7148665A1814}"/>
+                <a16:creationId xmlns:a16="http://schemas.microsoft.com/office/drawing/2014/main" id="{20A443A0-0C68-4490-BAFF-36369D47A74E}"/>
               </a:ext>
             </a:extLst>
           </p:cNvPr>
@@ -22935,7 +22936,7 @@
           <p:cNvPr id="5" name="Imagen 4">
             <a:extLst>
               <a:ext uri="{FF2B5EF4-FFF2-40B4-BE49-F238E27FC236}">
-                <a16:creationId xmlns:a16="http://schemas.microsoft.com/office/drawing/2014/main" id="{CEA35A73-2D97-4495-B00C-BFC2DD949EE1}"/>
+                <a16:creationId xmlns:a16="http://schemas.microsoft.com/office/drawing/2014/main" id="{87EB2C19-997B-407E-84B6-0931528FAB89}"/>
               </a:ext>
             </a:extLst>
           </p:cNvPr>
@@ -22952,8 +22953,8 @@
         </p:blipFill>
         <p:spPr>
           <a:xfrm>
-            <a:off x="1464891" y="322209"/>
-            <a:ext cx="10729192" cy="6477000"/>
+            <a:off x="1032843" y="540271"/>
+            <a:ext cx="11521280" cy="5724525"/>
           </a:xfrm>
           <a:prstGeom prst="rect">
             <a:avLst/>
@@ -22963,7 +22964,7 @@
     </p:spTree>
     <p:extLst>
       <p:ext uri="{BB962C8B-B14F-4D97-AF65-F5344CB8AC3E}">
-        <p14:creationId xmlns:p14="http://schemas.microsoft.com/office/powerpoint/2010/main" val="1829519105"/>
+        <p14:creationId xmlns:p14="http://schemas.microsoft.com/office/powerpoint/2010/main" val="2125145163"/>
       </p:ext>
     </p:extLst>
   </p:cSld>
@@ -22995,7 +22996,7 @@
           <p:cNvPr id="2" name="Marcador de contenido 1">
             <a:extLst>
               <a:ext uri="{FF2B5EF4-FFF2-40B4-BE49-F238E27FC236}">
-                <a16:creationId xmlns:a16="http://schemas.microsoft.com/office/drawing/2014/main" id="{8F21A9A5-BBF2-4EED-A19A-4FA270E65BF1}"/>
+                <a16:creationId xmlns:a16="http://schemas.microsoft.com/office/drawing/2014/main" id="{A1BF1E6A-2AAA-4E56-98F5-1E10D5BCB15E}"/>
               </a:ext>
             </a:extLst>
           </p:cNvPr>
@@ -23020,7 +23021,7 @@
           <p:cNvPr id="3" name="Título 2">
             <a:extLst>
               <a:ext uri="{FF2B5EF4-FFF2-40B4-BE49-F238E27FC236}">
-                <a16:creationId xmlns:a16="http://schemas.microsoft.com/office/drawing/2014/main" id="{52656D7A-22DB-47D4-89E9-A7F19A809957}"/>
+                <a16:creationId xmlns:a16="http://schemas.microsoft.com/office/drawing/2014/main" id="{D7719DE4-60D3-47AE-A545-2EA62D105DEE}"/>
               </a:ext>
             </a:extLst>
           </p:cNvPr>
@@ -23045,7 +23046,7 @@
           <p:cNvPr id="4" name="Marcador de número de diapositiva 3">
             <a:extLst>
               <a:ext uri="{FF2B5EF4-FFF2-40B4-BE49-F238E27FC236}">
-                <a16:creationId xmlns:a16="http://schemas.microsoft.com/office/drawing/2014/main" id="{15E26CD1-FBE5-49DD-B9B8-BF6D1E917596}"/>
+                <a16:creationId xmlns:a16="http://schemas.microsoft.com/office/drawing/2014/main" id="{0DE7B444-DE5E-4595-82D3-7148665A1814}"/>
               </a:ext>
             </a:extLst>
           </p:cNvPr>
@@ -23079,7 +23080,7 @@
           <p:cNvPr id="5" name="Imagen 4">
             <a:extLst>
               <a:ext uri="{FF2B5EF4-FFF2-40B4-BE49-F238E27FC236}">
-                <a16:creationId xmlns:a16="http://schemas.microsoft.com/office/drawing/2014/main" id="{07DB54C6-6350-488D-A17D-EE2B0BA44DA1}"/>
+                <a16:creationId xmlns:a16="http://schemas.microsoft.com/office/drawing/2014/main" id="{CEA35A73-2D97-4495-B00C-BFC2DD949EE1}"/>
               </a:ext>
             </a:extLst>
           </p:cNvPr>
@@ -23096,8 +23097,8 @@
         </p:blipFill>
         <p:spPr>
           <a:xfrm>
-            <a:off x="816819" y="330689"/>
-            <a:ext cx="11809312" cy="6448425"/>
+            <a:off x="1464891" y="322209"/>
+            <a:ext cx="10729192" cy="6477000"/>
           </a:xfrm>
           <a:prstGeom prst="rect">
             <a:avLst/>
@@ -23107,7 +23108,7 @@
     </p:spTree>
     <p:extLst>
       <p:ext uri="{BB962C8B-B14F-4D97-AF65-F5344CB8AC3E}">
-        <p14:creationId xmlns:p14="http://schemas.microsoft.com/office/powerpoint/2010/main" val="1174598302"/>
+        <p14:creationId xmlns:p14="http://schemas.microsoft.com/office/powerpoint/2010/main" val="1829519105"/>
       </p:ext>
     </p:extLst>
   </p:cSld>
@@ -23321,7 +23322,7 @@
           <p:cNvPr id="2" name="Marcador de contenido 1">
             <a:extLst>
               <a:ext uri="{FF2B5EF4-FFF2-40B4-BE49-F238E27FC236}">
-                <a16:creationId xmlns:a16="http://schemas.microsoft.com/office/drawing/2014/main" id="{AF160C00-E11E-4A58-91E2-39CBF4CF8AA9}"/>
+                <a16:creationId xmlns:a16="http://schemas.microsoft.com/office/drawing/2014/main" id="{8F21A9A5-BBF2-4EED-A19A-4FA270E65BF1}"/>
               </a:ext>
             </a:extLst>
           </p:cNvPr>
@@ -23346,7 +23347,7 @@
           <p:cNvPr id="3" name="Título 2">
             <a:extLst>
               <a:ext uri="{FF2B5EF4-FFF2-40B4-BE49-F238E27FC236}">
-                <a16:creationId xmlns:a16="http://schemas.microsoft.com/office/drawing/2014/main" id="{E04E5FA6-C3C5-4061-BE2D-BD248B962456}"/>
+                <a16:creationId xmlns:a16="http://schemas.microsoft.com/office/drawing/2014/main" id="{52656D7A-22DB-47D4-89E9-A7F19A809957}"/>
               </a:ext>
             </a:extLst>
           </p:cNvPr>
@@ -23371,7 +23372,7 @@
           <p:cNvPr id="4" name="Marcador de número de diapositiva 3">
             <a:extLst>
               <a:ext uri="{FF2B5EF4-FFF2-40B4-BE49-F238E27FC236}">
-                <a16:creationId xmlns:a16="http://schemas.microsoft.com/office/drawing/2014/main" id="{2DD38AD0-8151-4C94-B78F-5BBC7EF4D351}"/>
+                <a16:creationId xmlns:a16="http://schemas.microsoft.com/office/drawing/2014/main" id="{15E26CD1-FBE5-49DD-B9B8-BF6D1E917596}"/>
               </a:ext>
             </a:extLst>
           </p:cNvPr>
@@ -23402,10 +23403,10 @@
       </p:sp>
       <p:pic>
         <p:nvPicPr>
-          <p:cNvPr id="6" name="Imagen 5">
+          <p:cNvPr id="5" name="Imagen 4">
             <a:extLst>
               <a:ext uri="{FF2B5EF4-FFF2-40B4-BE49-F238E27FC236}">
-                <a16:creationId xmlns:a16="http://schemas.microsoft.com/office/drawing/2014/main" id="{83CF9E8B-5172-42CF-ACB9-626BB2113791}"/>
+                <a16:creationId xmlns:a16="http://schemas.microsoft.com/office/drawing/2014/main" id="{07DB54C6-6350-488D-A17D-EE2B0BA44DA1}"/>
               </a:ext>
             </a:extLst>
           </p:cNvPr>
@@ -23422,8 +23423,8 @@
         </p:blipFill>
         <p:spPr>
           <a:xfrm>
-            <a:off x="1320875" y="302801"/>
-            <a:ext cx="10829925" cy="6619875"/>
+            <a:off x="816819" y="330689"/>
+            <a:ext cx="11809312" cy="6448425"/>
           </a:xfrm>
           <a:prstGeom prst="rect">
             <a:avLst/>
@@ -23433,7 +23434,7 @@
     </p:spTree>
     <p:extLst>
       <p:ext uri="{BB962C8B-B14F-4D97-AF65-F5344CB8AC3E}">
-        <p14:creationId xmlns:p14="http://schemas.microsoft.com/office/powerpoint/2010/main" val="353107229"/>
+        <p14:creationId xmlns:p14="http://schemas.microsoft.com/office/powerpoint/2010/main" val="1174598302"/>
       </p:ext>
     </p:extLst>
   </p:cSld>
@@ -23465,7 +23466,7 @@
           <p:cNvPr id="2" name="Marcador de contenido 1">
             <a:extLst>
               <a:ext uri="{FF2B5EF4-FFF2-40B4-BE49-F238E27FC236}">
-                <a16:creationId xmlns:a16="http://schemas.microsoft.com/office/drawing/2014/main" id="{45A1EB18-CF72-4CCF-B6CE-C270A593E9CF}"/>
+                <a16:creationId xmlns:a16="http://schemas.microsoft.com/office/drawing/2014/main" id="{AF160C00-E11E-4A58-91E2-39CBF4CF8AA9}"/>
               </a:ext>
             </a:extLst>
           </p:cNvPr>
@@ -23490,7 +23491,7 @@
           <p:cNvPr id="3" name="Título 2">
             <a:extLst>
               <a:ext uri="{FF2B5EF4-FFF2-40B4-BE49-F238E27FC236}">
-                <a16:creationId xmlns:a16="http://schemas.microsoft.com/office/drawing/2014/main" id="{F5DE1E50-B3BB-49E3-9B9B-138278389C20}"/>
+                <a16:creationId xmlns:a16="http://schemas.microsoft.com/office/drawing/2014/main" id="{E04E5FA6-C3C5-4061-BE2D-BD248B962456}"/>
               </a:ext>
             </a:extLst>
           </p:cNvPr>
@@ -23515,7 +23516,7 @@
           <p:cNvPr id="4" name="Marcador de número de diapositiva 3">
             <a:extLst>
               <a:ext uri="{FF2B5EF4-FFF2-40B4-BE49-F238E27FC236}">
-                <a16:creationId xmlns:a16="http://schemas.microsoft.com/office/drawing/2014/main" id="{8C0FEA7C-07E3-41EB-8DF4-3D79327174CB}"/>
+                <a16:creationId xmlns:a16="http://schemas.microsoft.com/office/drawing/2014/main" id="{2DD38AD0-8151-4C94-B78F-5BBC7EF4D351}"/>
               </a:ext>
             </a:extLst>
           </p:cNvPr>
@@ -23546,10 +23547,10 @@
       </p:sp>
       <p:pic>
         <p:nvPicPr>
-          <p:cNvPr id="5" name="Imagen 4">
+          <p:cNvPr id="6" name="Imagen 5">
             <a:extLst>
               <a:ext uri="{FF2B5EF4-FFF2-40B4-BE49-F238E27FC236}">
-                <a16:creationId xmlns:a16="http://schemas.microsoft.com/office/drawing/2014/main" id="{F2F0C7C5-002A-4CD9-A14F-1628F922479E}"/>
+                <a16:creationId xmlns:a16="http://schemas.microsoft.com/office/drawing/2014/main" id="{83CF9E8B-5172-42CF-ACB9-626BB2113791}"/>
               </a:ext>
             </a:extLst>
           </p:cNvPr>
@@ -23566,8 +23567,8 @@
         </p:blipFill>
         <p:spPr>
           <a:xfrm>
-            <a:off x="1382712" y="513556"/>
-            <a:ext cx="10677525" cy="6534150"/>
+            <a:off x="1320875" y="302801"/>
+            <a:ext cx="10829925" cy="6619875"/>
           </a:xfrm>
           <a:prstGeom prst="rect">
             <a:avLst/>
@@ -23577,7 +23578,7 @@
     </p:spTree>
     <p:extLst>
       <p:ext uri="{BB962C8B-B14F-4D97-AF65-F5344CB8AC3E}">
-        <p14:creationId xmlns:p14="http://schemas.microsoft.com/office/powerpoint/2010/main" val="3023826604"/>
+        <p14:creationId xmlns:p14="http://schemas.microsoft.com/office/powerpoint/2010/main" val="353107229"/>
       </p:ext>
     </p:extLst>
   </p:cSld>
@@ -23609,7 +23610,7 @@
           <p:cNvPr id="2" name="Marcador de contenido 1">
             <a:extLst>
               <a:ext uri="{FF2B5EF4-FFF2-40B4-BE49-F238E27FC236}">
-                <a16:creationId xmlns:a16="http://schemas.microsoft.com/office/drawing/2014/main" id="{39EF69CE-E12D-41A3-8BAE-B9FD76911F80}"/>
+                <a16:creationId xmlns:a16="http://schemas.microsoft.com/office/drawing/2014/main" id="{45A1EB18-CF72-4CCF-B6CE-C270A593E9CF}"/>
               </a:ext>
             </a:extLst>
           </p:cNvPr>
@@ -23634,7 +23635,7 @@
           <p:cNvPr id="3" name="Título 2">
             <a:extLst>
               <a:ext uri="{FF2B5EF4-FFF2-40B4-BE49-F238E27FC236}">
-                <a16:creationId xmlns:a16="http://schemas.microsoft.com/office/drawing/2014/main" id="{8EE0E97F-5CEA-4CDE-8A6D-658AE4C28B4E}"/>
+                <a16:creationId xmlns:a16="http://schemas.microsoft.com/office/drawing/2014/main" id="{F5DE1E50-B3BB-49E3-9B9B-138278389C20}"/>
               </a:ext>
             </a:extLst>
           </p:cNvPr>
@@ -23659,7 +23660,7 @@
           <p:cNvPr id="4" name="Marcador de número de diapositiva 3">
             <a:extLst>
               <a:ext uri="{FF2B5EF4-FFF2-40B4-BE49-F238E27FC236}">
-                <a16:creationId xmlns:a16="http://schemas.microsoft.com/office/drawing/2014/main" id="{6B9F00AB-5471-48D9-A573-02A2D5D955ED}"/>
+                <a16:creationId xmlns:a16="http://schemas.microsoft.com/office/drawing/2014/main" id="{8C0FEA7C-07E3-41EB-8DF4-3D79327174CB}"/>
               </a:ext>
             </a:extLst>
           </p:cNvPr>
@@ -23693,7 +23694,7 @@
           <p:cNvPr id="5" name="Imagen 4">
             <a:extLst>
               <a:ext uri="{FF2B5EF4-FFF2-40B4-BE49-F238E27FC236}">
-                <a16:creationId xmlns:a16="http://schemas.microsoft.com/office/drawing/2014/main" id="{D68F09A2-696B-49F0-9353-C01B96708FF5}"/>
+                <a16:creationId xmlns:a16="http://schemas.microsoft.com/office/drawing/2014/main" id="{F2F0C7C5-002A-4CD9-A14F-1628F922479E}"/>
               </a:ext>
             </a:extLst>
           </p:cNvPr>
@@ -23710,8 +23711,8 @@
         </p:blipFill>
         <p:spPr>
           <a:xfrm>
-            <a:off x="1320875" y="468263"/>
-            <a:ext cx="11049000" cy="6315075"/>
+            <a:off x="1382712" y="513556"/>
+            <a:ext cx="10677525" cy="6534150"/>
           </a:xfrm>
           <a:prstGeom prst="rect">
             <a:avLst/>
@@ -23721,7 +23722,7 @@
     </p:spTree>
     <p:extLst>
       <p:ext uri="{BB962C8B-B14F-4D97-AF65-F5344CB8AC3E}">
-        <p14:creationId xmlns:p14="http://schemas.microsoft.com/office/powerpoint/2010/main" val="234512487"/>
+        <p14:creationId xmlns:p14="http://schemas.microsoft.com/office/powerpoint/2010/main" val="3023826604"/>
       </p:ext>
     </p:extLst>
   </p:cSld>
@@ -23750,10 +23751,35 @@
       </p:grpSpPr>
       <p:sp>
         <p:nvSpPr>
-          <p:cNvPr id="5" name="Título 4">
+          <p:cNvPr id="2" name="Marcador de contenido 1">
             <a:extLst>
               <a:ext uri="{FF2B5EF4-FFF2-40B4-BE49-F238E27FC236}">
-                <a16:creationId xmlns:a16="http://schemas.microsoft.com/office/drawing/2014/main" id="{0CEA23A4-DA25-4EC2-9E8C-2CCF6DBA69A2}"/>
+                <a16:creationId xmlns:a16="http://schemas.microsoft.com/office/drawing/2014/main" id="{39EF69CE-E12D-41A3-8BAE-B9FD76911F80}"/>
+              </a:ext>
+            </a:extLst>
+          </p:cNvPr>
+          <p:cNvSpPr>
+            <a:spLocks noGrp="1"/>
+          </p:cNvSpPr>
+          <p:nvPr>
+            <p:ph idx="1"/>
+          </p:nvPr>
+        </p:nvSpPr>
+        <p:spPr/>
+        <p:txBody>
+          <a:bodyPr/>
+          <a:lstStyle/>
+          <a:p>
+            <a:endParaRPr lang="es-ES"/>
+          </a:p>
+        </p:txBody>
+      </p:sp>
+      <p:sp>
+        <p:nvSpPr>
+          <p:cNvPr id="3" name="Título 2">
+            <a:extLst>
+              <a:ext uri="{FF2B5EF4-FFF2-40B4-BE49-F238E27FC236}">
+                <a16:creationId xmlns:a16="http://schemas.microsoft.com/office/drawing/2014/main" id="{8EE0E97F-5CEA-4CDE-8A6D-658AE4C28B4E}"/>
               </a:ext>
             </a:extLst>
           </p:cNvPr>
@@ -23769,15 +23795,7 @@
           <a:bodyPr/>
           <a:lstStyle/>
           <a:p>
-            <a:r>
-              <a:rPr lang="es-ES" dirty="0"/>
-              <a:t>Crear y Consumir </a:t>
-            </a:r>
-            <a:r>
-              <a:rPr lang="es-ES" dirty="0" err="1"/>
-              <a:t>Modulos</a:t>
-            </a:r>
-            <a:endParaRPr lang="es-ES" dirty="0"/>
+            <a:endParaRPr lang="es-ES"/>
           </a:p>
         </p:txBody>
       </p:sp>
@@ -23786,7 +23804,7 @@
           <p:cNvPr id="4" name="Marcador de número de diapositiva 3">
             <a:extLst>
               <a:ext uri="{FF2B5EF4-FFF2-40B4-BE49-F238E27FC236}">
-                <a16:creationId xmlns:a16="http://schemas.microsoft.com/office/drawing/2014/main" id="{6F39C787-BE4A-49AC-936E-59917B31F6A8}"/>
+                <a16:creationId xmlns:a16="http://schemas.microsoft.com/office/drawing/2014/main" id="{6B9F00AB-5471-48D9-A573-02A2D5D955ED}"/>
               </a:ext>
             </a:extLst>
           </p:cNvPr>
@@ -23794,15 +23812,10 @@
             <a:spLocks noGrp="1"/>
           </p:cNvSpPr>
           <p:nvPr>
-            <p:ph type="sldNum" sz="quarter" idx="4294967295"/>
+            <p:ph type="sldNum" sz="quarter" idx="4"/>
           </p:nvPr>
         </p:nvSpPr>
-        <p:spPr>
-          <a:xfrm>
-            <a:off x="0" y="6897688"/>
-            <a:ext cx="661988" cy="468312"/>
-          </a:xfrm>
-        </p:spPr>
+        <p:spPr/>
         <p:txBody>
           <a:bodyPr/>
           <a:lstStyle/>
@@ -23820,10 +23833,40 @@
           </a:p>
         </p:txBody>
       </p:sp>
+      <p:pic>
+        <p:nvPicPr>
+          <p:cNvPr id="5" name="Imagen 4">
+            <a:extLst>
+              <a:ext uri="{FF2B5EF4-FFF2-40B4-BE49-F238E27FC236}">
+                <a16:creationId xmlns:a16="http://schemas.microsoft.com/office/drawing/2014/main" id="{D68F09A2-696B-49F0-9353-C01B96708FF5}"/>
+              </a:ext>
+            </a:extLst>
+          </p:cNvPr>
+          <p:cNvPicPr>
+            <a:picLocks noChangeAspect="1"/>
+          </p:cNvPicPr>
+          <p:nvPr/>
+        </p:nvPicPr>
+        <p:blipFill>
+          <a:blip r:embed="rId2"/>
+          <a:stretch>
+            <a:fillRect/>
+          </a:stretch>
+        </p:blipFill>
+        <p:spPr>
+          <a:xfrm>
+            <a:off x="1320875" y="468263"/>
+            <a:ext cx="11049000" cy="6315075"/>
+          </a:xfrm>
+          <a:prstGeom prst="rect">
+            <a:avLst/>
+          </a:prstGeom>
+        </p:spPr>
+      </p:pic>
     </p:spTree>
     <p:extLst>
       <p:ext uri="{BB962C8B-B14F-4D97-AF65-F5344CB8AC3E}">
-        <p14:creationId xmlns:p14="http://schemas.microsoft.com/office/powerpoint/2010/main" val="3869534235"/>
+        <p14:creationId xmlns:p14="http://schemas.microsoft.com/office/powerpoint/2010/main" val="234512487"/>
       </p:ext>
     </p:extLst>
   </p:cSld>
@@ -23852,53 +23895,10 @@
       </p:grpSpPr>
       <p:sp>
         <p:nvSpPr>
-          <p:cNvPr id="4" name="Marcador de contenido 3">
+          <p:cNvPr id="5" name="Título 4">
             <a:extLst>
               <a:ext uri="{FF2B5EF4-FFF2-40B4-BE49-F238E27FC236}">
-                <a16:creationId xmlns:a16="http://schemas.microsoft.com/office/drawing/2014/main" id="{11939966-A176-496A-902F-D4F6449468E8}"/>
-              </a:ext>
-            </a:extLst>
-          </p:cNvPr>
-          <p:cNvSpPr>
-            <a:spLocks noGrp="1"/>
-          </p:cNvSpPr>
-          <p:nvPr>
-            <p:ph idx="1"/>
-          </p:nvPr>
-        </p:nvSpPr>
-        <p:spPr/>
-        <p:txBody>
-          <a:bodyPr>
-            <a:normAutofit/>
-          </a:bodyPr>
-          <a:lstStyle/>
-          <a:p>
-            <a:r>
-              <a:rPr lang="es-ES" sz="3200" dirty="0"/>
-              <a:t>Encapsulación</a:t>
-            </a:r>
-          </a:p>
-          <a:p>
-            <a:r>
-              <a:rPr lang="es-ES" sz="3200" dirty="0" err="1"/>
-              <a:t>Reusablidad</a:t>
-            </a:r>
-            <a:endParaRPr lang="es-ES" sz="3200" dirty="0"/>
-          </a:p>
-          <a:p>
-            <a:r>
-              <a:rPr lang="es-ES" sz="3200" dirty="0"/>
-              <a:t>Crear abstracción de alto nivel</a:t>
-            </a:r>
-          </a:p>
-        </p:txBody>
-      </p:sp>
-      <p:sp>
-        <p:nvSpPr>
-          <p:cNvPr id="3" name="Título 2">
-            <a:extLst>
-              <a:ext uri="{FF2B5EF4-FFF2-40B4-BE49-F238E27FC236}">
-                <a16:creationId xmlns:a16="http://schemas.microsoft.com/office/drawing/2014/main" id="{FE78E09D-48E5-438D-BFF2-AD1123270449}"/>
+                <a16:creationId xmlns:a16="http://schemas.microsoft.com/office/drawing/2014/main" id="{0CEA23A4-DA25-4EC2-9E8C-2CCF6DBA69A2}"/>
               </a:ext>
             </a:extLst>
           </p:cNvPr>
@@ -23916,20 +23916,59 @@
           <a:p>
             <a:r>
               <a:rPr lang="es-ES" dirty="0"/>
-              <a:t>¿Por qué usar </a:t>
+              <a:t>Crear y Consumir </a:t>
             </a:r>
             <a:r>
               <a:rPr lang="es-ES" dirty="0" err="1"/>
               <a:t>Modulos</a:t>
             </a:r>
             <a:endParaRPr lang="es-ES" dirty="0"/>
+          </a:p>
+        </p:txBody>
+      </p:sp>
+      <p:sp>
+        <p:nvSpPr>
+          <p:cNvPr id="4" name="Marcador de número de diapositiva 3">
+            <a:extLst>
+              <a:ext uri="{FF2B5EF4-FFF2-40B4-BE49-F238E27FC236}">
+                <a16:creationId xmlns:a16="http://schemas.microsoft.com/office/drawing/2014/main" id="{6F39C787-BE4A-49AC-936E-59917B31F6A8}"/>
+              </a:ext>
+            </a:extLst>
+          </p:cNvPr>
+          <p:cNvSpPr>
+            <a:spLocks noGrp="1"/>
+          </p:cNvSpPr>
+          <p:nvPr>
+            <p:ph type="sldNum" sz="quarter" idx="4294967295"/>
+          </p:nvPr>
+        </p:nvSpPr>
+        <p:spPr>
+          <a:xfrm>
+            <a:off x="0" y="6897688"/>
+            <a:ext cx="661988" cy="468312"/>
+          </a:xfrm>
+        </p:spPr>
+        <p:txBody>
+          <a:bodyPr/>
+          <a:lstStyle/>
+          <a:p>
+            <a:fld id="{C0C6E1E5-C711-49C2-AC1C-A8C0A200779D}" type="slidenum">
+              <a:rPr lang="es-ES" smtClean="0">
+                <a:cs typeface="Segoe UI Light" panose="020B0502040204020203" pitchFamily="34" charset="0"/>
+              </a:rPr>
+              <a:pPr/>
+              <a:t>34</a:t>
+            </a:fld>
+            <a:endParaRPr lang="es-ES" dirty="0">
+              <a:cs typeface="Segoe UI Light" panose="020B0502040204020203" pitchFamily="34" charset="0"/>
+            </a:endParaRPr>
           </a:p>
         </p:txBody>
       </p:sp>
     </p:spTree>
     <p:extLst>
       <p:ext uri="{BB962C8B-B14F-4D97-AF65-F5344CB8AC3E}">
-        <p14:creationId xmlns:p14="http://schemas.microsoft.com/office/powerpoint/2010/main" val="3690950132"/>
+        <p14:creationId xmlns:p14="http://schemas.microsoft.com/office/powerpoint/2010/main" val="3869534235"/>
       </p:ext>
     </p:extLst>
   </p:cSld>
@@ -23958,6 +23997,112 @@
       </p:grpSpPr>
       <p:sp>
         <p:nvSpPr>
+          <p:cNvPr id="4" name="Marcador de contenido 3">
+            <a:extLst>
+              <a:ext uri="{FF2B5EF4-FFF2-40B4-BE49-F238E27FC236}">
+                <a16:creationId xmlns:a16="http://schemas.microsoft.com/office/drawing/2014/main" id="{11939966-A176-496A-902F-D4F6449468E8}"/>
+              </a:ext>
+            </a:extLst>
+          </p:cNvPr>
+          <p:cNvSpPr>
+            <a:spLocks noGrp="1"/>
+          </p:cNvSpPr>
+          <p:nvPr>
+            <p:ph idx="1"/>
+          </p:nvPr>
+        </p:nvSpPr>
+        <p:spPr/>
+        <p:txBody>
+          <a:bodyPr>
+            <a:normAutofit/>
+          </a:bodyPr>
+          <a:lstStyle/>
+          <a:p>
+            <a:r>
+              <a:rPr lang="es-ES" sz="3200" dirty="0"/>
+              <a:t>Encapsulación</a:t>
+            </a:r>
+          </a:p>
+          <a:p>
+            <a:r>
+              <a:rPr lang="es-ES" sz="3200" dirty="0" err="1"/>
+              <a:t>Reusablidad</a:t>
+            </a:r>
+            <a:endParaRPr lang="es-ES" sz="3200" dirty="0"/>
+          </a:p>
+          <a:p>
+            <a:r>
+              <a:rPr lang="es-ES" sz="3200" dirty="0"/>
+              <a:t>Crear abstracción de alto nivel</a:t>
+            </a:r>
+          </a:p>
+        </p:txBody>
+      </p:sp>
+      <p:sp>
+        <p:nvSpPr>
+          <p:cNvPr id="3" name="Título 2">
+            <a:extLst>
+              <a:ext uri="{FF2B5EF4-FFF2-40B4-BE49-F238E27FC236}">
+                <a16:creationId xmlns:a16="http://schemas.microsoft.com/office/drawing/2014/main" id="{FE78E09D-48E5-438D-BFF2-AD1123270449}"/>
+              </a:ext>
+            </a:extLst>
+          </p:cNvPr>
+          <p:cNvSpPr>
+            <a:spLocks noGrp="1"/>
+          </p:cNvSpPr>
+          <p:nvPr>
+            <p:ph type="title"/>
+          </p:nvPr>
+        </p:nvSpPr>
+        <p:spPr/>
+        <p:txBody>
+          <a:bodyPr/>
+          <a:lstStyle/>
+          <a:p>
+            <a:r>
+              <a:rPr lang="es-ES" dirty="0"/>
+              <a:t>¿Por qué usar </a:t>
+            </a:r>
+            <a:r>
+              <a:rPr lang="es-ES" dirty="0" err="1"/>
+              <a:t>Modulos</a:t>
+            </a:r>
+            <a:endParaRPr lang="es-ES" dirty="0"/>
+          </a:p>
+        </p:txBody>
+      </p:sp>
+    </p:spTree>
+    <p:extLst>
+      <p:ext uri="{BB962C8B-B14F-4D97-AF65-F5344CB8AC3E}">
+        <p14:creationId xmlns:p14="http://schemas.microsoft.com/office/powerpoint/2010/main" val="3690950132"/>
+      </p:ext>
+    </p:extLst>
+  </p:cSld>
+  <p:clrMapOvr>
+    <a:masterClrMapping/>
+  </p:clrMapOvr>
+</p:sld>
+</file>
+
+<file path=ppt/slides/slide36.xml><?xml version="1.0" encoding="utf-8"?>
+<p:sld xmlns:a="http://schemas.openxmlformats.org/drawingml/2006/main" xmlns:r="http://schemas.openxmlformats.org/officeDocument/2006/relationships" xmlns:p="http://schemas.openxmlformats.org/presentationml/2006/main">
+  <p:cSld>
+    <p:spTree>
+      <p:nvGrpSpPr>
+        <p:cNvPr id="1" name=""/>
+        <p:cNvGrpSpPr/>
+        <p:nvPr/>
+      </p:nvGrpSpPr>
+      <p:grpSpPr>
+        <a:xfrm>
+          <a:off x="0" y="0"/>
+          <a:ext cx="0" cy="0"/>
+          <a:chOff x="0" y="0"/>
+          <a:chExt cx="0" cy="0"/>
+        </a:xfrm>
+      </p:grpSpPr>
+      <p:sp>
+        <p:nvSpPr>
           <p:cNvPr id="2" name="Marcador de contenido 1">
             <a:extLst>
               <a:ext uri="{FF2B5EF4-FFF2-40B4-BE49-F238E27FC236}">
@@ -24035,7 +24180,7 @@
                 <a:cs typeface="Segoe UI Light" panose="020B0502040204020203" pitchFamily="34" charset="0"/>
               </a:rPr>
               <a:pPr/>
-              <a:t>35</a:t>
+              <a:t>36</a:t>
             </a:fld>
             <a:endParaRPr lang="es-ES" dirty="0">
               <a:cs typeface="Segoe UI Light" panose="020B0502040204020203" pitchFamily="34" charset="0"/>
@@ -24086,7 +24231,7 @@
 </p:sld>
 </file>
 
-<file path=ppt/slides/slide36.xml><?xml version="1.0" encoding="utf-8"?>
+<file path=ppt/slides/slide37.xml><?xml version="1.0" encoding="utf-8"?>
 <p:sld xmlns:a="http://schemas.openxmlformats.org/drawingml/2006/main" xmlns:r="http://schemas.openxmlformats.org/officeDocument/2006/relationships" xmlns:p="http://schemas.openxmlformats.org/presentationml/2006/main">
   <p:cSld>
     <p:spTree>
@@ -24189,7 +24334,7 @@
                 <a:cs typeface="Segoe UI Light" panose="020B0502040204020203" pitchFamily="34" charset="0"/>
               </a:rPr>
               <a:pPr/>
-              <a:t>36</a:t>
+              <a:t>37</a:t>
             </a:fld>
             <a:endParaRPr lang="es-ES" dirty="0">
               <a:cs typeface="Segoe UI Light" panose="020B0502040204020203" pitchFamily="34" charset="0"/>
@@ -24210,7 +24355,7 @@
 </p:sld>
 </file>
 
-<file path=ppt/slides/slide37.xml><?xml version="1.0" encoding="utf-8"?>
+<file path=ppt/slides/slide38.xml><?xml version="1.0" encoding="utf-8"?>
 <p:sld xmlns:a="http://schemas.openxmlformats.org/drawingml/2006/main" xmlns:r="http://schemas.openxmlformats.org/officeDocument/2006/relationships" xmlns:p="http://schemas.openxmlformats.org/presentationml/2006/main">
   <p:cSld>
     <p:spTree>
@@ -24313,7 +24458,7 @@
                 <a:cs typeface="Segoe UI Light" panose="020B0502040204020203" pitchFamily="34" charset="0"/>
               </a:rPr>
               <a:pPr/>
-              <a:t>37</a:t>
+              <a:t>38</a:t>
             </a:fld>
             <a:endParaRPr lang="es-ES" dirty="0">
               <a:cs typeface="Segoe UI Light" panose="020B0502040204020203" pitchFamily="34" charset="0"/>
@@ -24334,7 +24479,7 @@
 </p:sld>
 </file>
 
-<file path=ppt/slides/slide38.xml><?xml version="1.0" encoding="utf-8"?>
+<file path=ppt/slides/slide39.xml><?xml version="1.0" encoding="utf-8"?>
 <p:sld xmlns:a="http://schemas.openxmlformats.org/drawingml/2006/main" xmlns:r="http://schemas.openxmlformats.org/officeDocument/2006/relationships" xmlns:p="http://schemas.openxmlformats.org/presentationml/2006/main">
   <p:cSld>
     <p:spTree>
@@ -24437,120 +24582,6 @@
                 <a:cs typeface="Segoe UI Light" panose="020B0502040204020203" pitchFamily="34" charset="0"/>
               </a:rPr>
               <a:pPr/>
-              <a:t>38</a:t>
-            </a:fld>
-            <a:endParaRPr lang="es-ES" dirty="0">
-              <a:cs typeface="Segoe UI Light" panose="020B0502040204020203" pitchFamily="34" charset="0"/>
-            </a:endParaRPr>
-          </a:p>
-        </p:txBody>
-      </p:sp>
-    </p:spTree>
-    <p:extLst>
-      <p:ext uri="{BB962C8B-B14F-4D97-AF65-F5344CB8AC3E}">
-        <p14:creationId xmlns:p14="http://schemas.microsoft.com/office/powerpoint/2010/main" val="182732388"/>
-      </p:ext>
-    </p:extLst>
-  </p:cSld>
-  <p:clrMapOvr>
-    <a:masterClrMapping/>
-  </p:clrMapOvr>
-</p:sld>
-</file>
-
-<file path=ppt/slides/slide39.xml><?xml version="1.0" encoding="utf-8"?>
-<p:sld xmlns:a="http://schemas.openxmlformats.org/drawingml/2006/main" xmlns:r="http://schemas.openxmlformats.org/officeDocument/2006/relationships" xmlns:p="http://schemas.openxmlformats.org/presentationml/2006/main">
-  <p:cSld>
-    <p:spTree>
-      <p:nvGrpSpPr>
-        <p:cNvPr id="1" name=""/>
-        <p:cNvGrpSpPr/>
-        <p:nvPr/>
-      </p:nvGrpSpPr>
-      <p:grpSpPr>
-        <a:xfrm>
-          <a:off x="0" y="0"/>
-          <a:ext cx="0" cy="0"/>
-          <a:chOff x="0" y="0"/>
-          <a:chExt cx="0" cy="0"/>
-        </a:xfrm>
-      </p:grpSpPr>
-      <p:sp>
-        <p:nvSpPr>
-          <p:cNvPr id="2" name="Marcador de contenido 1">
-            <a:extLst>
-              <a:ext uri="{FF2B5EF4-FFF2-40B4-BE49-F238E27FC236}">
-                <a16:creationId xmlns:a16="http://schemas.microsoft.com/office/drawing/2014/main" id="{D014BF80-D807-4EEF-9C61-2CCF920FADCE}"/>
-              </a:ext>
-            </a:extLst>
-          </p:cNvPr>
-          <p:cNvSpPr>
-            <a:spLocks noGrp="1"/>
-          </p:cNvSpPr>
-          <p:nvPr>
-            <p:ph idx="1"/>
-          </p:nvPr>
-        </p:nvSpPr>
-        <p:spPr/>
-        <p:txBody>
-          <a:bodyPr/>
-          <a:lstStyle/>
-          <a:p>
-            <a:endParaRPr lang="es-ES"/>
-          </a:p>
-        </p:txBody>
-      </p:sp>
-      <p:sp>
-        <p:nvSpPr>
-          <p:cNvPr id="3" name="Título 2">
-            <a:extLst>
-              <a:ext uri="{FF2B5EF4-FFF2-40B4-BE49-F238E27FC236}">
-                <a16:creationId xmlns:a16="http://schemas.microsoft.com/office/drawing/2014/main" id="{68061B5A-A2E4-47AA-B39E-2401BE9D2C57}"/>
-              </a:ext>
-            </a:extLst>
-          </p:cNvPr>
-          <p:cNvSpPr>
-            <a:spLocks noGrp="1"/>
-          </p:cNvSpPr>
-          <p:nvPr>
-            <p:ph type="title"/>
-          </p:nvPr>
-        </p:nvSpPr>
-        <p:spPr/>
-        <p:txBody>
-          <a:bodyPr/>
-          <a:lstStyle/>
-          <a:p>
-            <a:endParaRPr lang="es-ES"/>
-          </a:p>
-        </p:txBody>
-      </p:sp>
-      <p:sp>
-        <p:nvSpPr>
-          <p:cNvPr id="4" name="Marcador de número de diapositiva 3">
-            <a:extLst>
-              <a:ext uri="{FF2B5EF4-FFF2-40B4-BE49-F238E27FC236}">
-                <a16:creationId xmlns:a16="http://schemas.microsoft.com/office/drawing/2014/main" id="{DB97D25B-B10F-466C-A7D7-4352088E6EBA}"/>
-              </a:ext>
-            </a:extLst>
-          </p:cNvPr>
-          <p:cNvSpPr>
-            <a:spLocks noGrp="1"/>
-          </p:cNvSpPr>
-          <p:nvPr>
-            <p:ph type="sldNum" sz="quarter" idx="4"/>
-          </p:nvPr>
-        </p:nvSpPr>
-        <p:spPr/>
-        <p:txBody>
-          <a:bodyPr/>
-          <a:lstStyle/>
-          <a:p>
-            <a:fld id="{C0C6E1E5-C711-49C2-AC1C-A8C0A200779D}" type="slidenum">
-              <a:rPr lang="es-ES" smtClean="0">
-                <a:cs typeface="Segoe UI Light" panose="020B0502040204020203" pitchFamily="34" charset="0"/>
-              </a:rPr>
-              <a:pPr/>
               <a:t>39</a:t>
             </a:fld>
             <a:endParaRPr lang="es-ES" dirty="0">
@@ -24559,40 +24590,10 @@
           </a:p>
         </p:txBody>
       </p:sp>
-      <p:pic>
-        <p:nvPicPr>
-          <p:cNvPr id="5" name="Imagen 4">
-            <a:extLst>
-              <a:ext uri="{FF2B5EF4-FFF2-40B4-BE49-F238E27FC236}">
-                <a16:creationId xmlns:a16="http://schemas.microsoft.com/office/drawing/2014/main" id="{AF3B5105-BC3A-462F-86AA-607010610A94}"/>
-              </a:ext>
-            </a:extLst>
-          </p:cNvPr>
-          <p:cNvPicPr>
-            <a:picLocks noChangeAspect="1"/>
-          </p:cNvPicPr>
-          <p:nvPr/>
-        </p:nvPicPr>
-        <p:blipFill>
-          <a:blip r:embed="rId2"/>
-          <a:stretch>
-            <a:fillRect/>
-          </a:stretch>
-        </p:blipFill>
-        <p:spPr>
-          <a:xfrm>
-            <a:off x="896788" y="540271"/>
-            <a:ext cx="11458575" cy="5976664"/>
-          </a:xfrm>
-          <a:prstGeom prst="rect">
-            <a:avLst/>
-          </a:prstGeom>
-        </p:spPr>
-      </p:pic>
     </p:spTree>
     <p:extLst>
       <p:ext uri="{BB962C8B-B14F-4D97-AF65-F5344CB8AC3E}">
-        <p14:creationId xmlns:p14="http://schemas.microsoft.com/office/powerpoint/2010/main" val="1534975853"/>
+        <p14:creationId xmlns:p14="http://schemas.microsoft.com/office/powerpoint/2010/main" val="182732388"/>
       </p:ext>
     </p:extLst>
   </p:cSld>
@@ -24742,7 +24743,7 @@
           <p:cNvPr id="2" name="Marcador de contenido 1">
             <a:extLst>
               <a:ext uri="{FF2B5EF4-FFF2-40B4-BE49-F238E27FC236}">
-                <a16:creationId xmlns:a16="http://schemas.microsoft.com/office/drawing/2014/main" id="{CF414977-AB17-4FD1-8739-6C63B9EBDC77}"/>
+                <a16:creationId xmlns:a16="http://schemas.microsoft.com/office/drawing/2014/main" id="{D014BF80-D807-4EEF-9C61-2CCF920FADCE}"/>
               </a:ext>
             </a:extLst>
           </p:cNvPr>
@@ -24767,7 +24768,7 @@
           <p:cNvPr id="3" name="Título 2">
             <a:extLst>
               <a:ext uri="{FF2B5EF4-FFF2-40B4-BE49-F238E27FC236}">
-                <a16:creationId xmlns:a16="http://schemas.microsoft.com/office/drawing/2014/main" id="{0C051A19-6C7D-4CF3-A22F-0807BB3C1D23}"/>
+                <a16:creationId xmlns:a16="http://schemas.microsoft.com/office/drawing/2014/main" id="{68061B5A-A2E4-47AA-B39E-2401BE9D2C57}"/>
               </a:ext>
             </a:extLst>
           </p:cNvPr>
@@ -24792,7 +24793,7 @@
           <p:cNvPr id="4" name="Marcador de número de diapositiva 3">
             <a:extLst>
               <a:ext uri="{FF2B5EF4-FFF2-40B4-BE49-F238E27FC236}">
-                <a16:creationId xmlns:a16="http://schemas.microsoft.com/office/drawing/2014/main" id="{D7B7EF69-BE14-4DA9-8B9D-F93A24160443}"/>
+                <a16:creationId xmlns:a16="http://schemas.microsoft.com/office/drawing/2014/main" id="{DB97D25B-B10F-466C-A7D7-4352088E6EBA}"/>
               </a:ext>
             </a:extLst>
           </p:cNvPr>
@@ -24826,7 +24827,7 @@
           <p:cNvPr id="5" name="Imagen 4">
             <a:extLst>
               <a:ext uri="{FF2B5EF4-FFF2-40B4-BE49-F238E27FC236}">
-                <a16:creationId xmlns:a16="http://schemas.microsoft.com/office/drawing/2014/main" id="{5E9BF293-B5C1-487E-9AED-1E7530A7CF1D}"/>
+                <a16:creationId xmlns:a16="http://schemas.microsoft.com/office/drawing/2014/main" id="{AF3B5105-BC3A-462F-86AA-607010610A94}"/>
               </a:ext>
             </a:extLst>
           </p:cNvPr>
@@ -24843,8 +24844,8 @@
         </p:blipFill>
         <p:spPr>
           <a:xfrm>
-            <a:off x="1413651" y="673564"/>
-            <a:ext cx="10525125" cy="5591175"/>
+            <a:off x="896788" y="540271"/>
+            <a:ext cx="11458575" cy="5976664"/>
           </a:xfrm>
           <a:prstGeom prst="rect">
             <a:avLst/>
@@ -24854,7 +24855,7 @@
     </p:spTree>
     <p:extLst>
       <p:ext uri="{BB962C8B-B14F-4D97-AF65-F5344CB8AC3E}">
-        <p14:creationId xmlns:p14="http://schemas.microsoft.com/office/powerpoint/2010/main" val="1406852283"/>
+        <p14:creationId xmlns:p14="http://schemas.microsoft.com/office/powerpoint/2010/main" val="1534975853"/>
       </p:ext>
     </p:extLst>
   </p:cSld>
@@ -24883,6 +24884,150 @@
       </p:grpSpPr>
       <p:sp>
         <p:nvSpPr>
+          <p:cNvPr id="2" name="Marcador de contenido 1">
+            <a:extLst>
+              <a:ext uri="{FF2B5EF4-FFF2-40B4-BE49-F238E27FC236}">
+                <a16:creationId xmlns:a16="http://schemas.microsoft.com/office/drawing/2014/main" id="{CF414977-AB17-4FD1-8739-6C63B9EBDC77}"/>
+              </a:ext>
+            </a:extLst>
+          </p:cNvPr>
+          <p:cNvSpPr>
+            <a:spLocks noGrp="1"/>
+          </p:cNvSpPr>
+          <p:nvPr>
+            <p:ph idx="1"/>
+          </p:nvPr>
+        </p:nvSpPr>
+        <p:spPr/>
+        <p:txBody>
+          <a:bodyPr/>
+          <a:lstStyle/>
+          <a:p>
+            <a:endParaRPr lang="es-ES"/>
+          </a:p>
+        </p:txBody>
+      </p:sp>
+      <p:sp>
+        <p:nvSpPr>
+          <p:cNvPr id="3" name="Título 2">
+            <a:extLst>
+              <a:ext uri="{FF2B5EF4-FFF2-40B4-BE49-F238E27FC236}">
+                <a16:creationId xmlns:a16="http://schemas.microsoft.com/office/drawing/2014/main" id="{0C051A19-6C7D-4CF3-A22F-0807BB3C1D23}"/>
+              </a:ext>
+            </a:extLst>
+          </p:cNvPr>
+          <p:cNvSpPr>
+            <a:spLocks noGrp="1"/>
+          </p:cNvSpPr>
+          <p:nvPr>
+            <p:ph type="title"/>
+          </p:nvPr>
+        </p:nvSpPr>
+        <p:spPr/>
+        <p:txBody>
+          <a:bodyPr/>
+          <a:lstStyle/>
+          <a:p>
+            <a:endParaRPr lang="es-ES"/>
+          </a:p>
+        </p:txBody>
+      </p:sp>
+      <p:sp>
+        <p:nvSpPr>
+          <p:cNvPr id="4" name="Marcador de número de diapositiva 3">
+            <a:extLst>
+              <a:ext uri="{FF2B5EF4-FFF2-40B4-BE49-F238E27FC236}">
+                <a16:creationId xmlns:a16="http://schemas.microsoft.com/office/drawing/2014/main" id="{D7B7EF69-BE14-4DA9-8B9D-F93A24160443}"/>
+              </a:ext>
+            </a:extLst>
+          </p:cNvPr>
+          <p:cNvSpPr>
+            <a:spLocks noGrp="1"/>
+          </p:cNvSpPr>
+          <p:nvPr>
+            <p:ph type="sldNum" sz="quarter" idx="4"/>
+          </p:nvPr>
+        </p:nvSpPr>
+        <p:spPr/>
+        <p:txBody>
+          <a:bodyPr/>
+          <a:lstStyle/>
+          <a:p>
+            <a:fld id="{C0C6E1E5-C711-49C2-AC1C-A8C0A200779D}" type="slidenum">
+              <a:rPr lang="es-ES" smtClean="0">
+                <a:cs typeface="Segoe UI Light" panose="020B0502040204020203" pitchFamily="34" charset="0"/>
+              </a:rPr>
+              <a:pPr/>
+              <a:t>41</a:t>
+            </a:fld>
+            <a:endParaRPr lang="es-ES" dirty="0">
+              <a:cs typeface="Segoe UI Light" panose="020B0502040204020203" pitchFamily="34" charset="0"/>
+            </a:endParaRPr>
+          </a:p>
+        </p:txBody>
+      </p:sp>
+      <p:pic>
+        <p:nvPicPr>
+          <p:cNvPr id="5" name="Imagen 4">
+            <a:extLst>
+              <a:ext uri="{FF2B5EF4-FFF2-40B4-BE49-F238E27FC236}">
+                <a16:creationId xmlns:a16="http://schemas.microsoft.com/office/drawing/2014/main" id="{5E9BF293-B5C1-487E-9AED-1E7530A7CF1D}"/>
+              </a:ext>
+            </a:extLst>
+          </p:cNvPr>
+          <p:cNvPicPr>
+            <a:picLocks noChangeAspect="1"/>
+          </p:cNvPicPr>
+          <p:nvPr/>
+        </p:nvPicPr>
+        <p:blipFill>
+          <a:blip r:embed="rId2"/>
+          <a:stretch>
+            <a:fillRect/>
+          </a:stretch>
+        </p:blipFill>
+        <p:spPr>
+          <a:xfrm>
+            <a:off x="1413651" y="673564"/>
+            <a:ext cx="10525125" cy="5591175"/>
+          </a:xfrm>
+          <a:prstGeom prst="rect">
+            <a:avLst/>
+          </a:prstGeom>
+        </p:spPr>
+      </p:pic>
+    </p:spTree>
+    <p:extLst>
+      <p:ext uri="{BB962C8B-B14F-4D97-AF65-F5344CB8AC3E}">
+        <p14:creationId xmlns:p14="http://schemas.microsoft.com/office/powerpoint/2010/main" val="1406852283"/>
+      </p:ext>
+    </p:extLst>
+  </p:cSld>
+  <p:clrMapOvr>
+    <a:masterClrMapping/>
+  </p:clrMapOvr>
+</p:sld>
+</file>
+
+<file path=ppt/slides/slide42.xml><?xml version="1.0" encoding="utf-8"?>
+<p:sld xmlns:a="http://schemas.openxmlformats.org/drawingml/2006/main" xmlns:r="http://schemas.openxmlformats.org/officeDocument/2006/relationships" xmlns:p="http://schemas.openxmlformats.org/presentationml/2006/main">
+  <p:cSld>
+    <p:spTree>
+      <p:nvGrpSpPr>
+        <p:cNvPr id="1" name=""/>
+        <p:cNvGrpSpPr/>
+        <p:nvPr/>
+      </p:nvGrpSpPr>
+      <p:grpSpPr>
+        <a:xfrm>
+          <a:off x="0" y="0"/>
+          <a:ext cx="0" cy="0"/>
+          <a:chOff x="0" y="0"/>
+          <a:chExt cx="0" cy="0"/>
+        </a:xfrm>
+      </p:grpSpPr>
+      <p:sp>
+        <p:nvSpPr>
           <p:cNvPr id="5" name="Título 4">
             <a:extLst>
               <a:ext uri="{FF2B5EF4-FFF2-40B4-BE49-F238E27FC236}">
@@ -24941,7 +25086,7 @@
                 <a:cs typeface="Segoe UI Light" panose="020B0502040204020203" pitchFamily="34" charset="0"/>
               </a:rPr>
               <a:pPr/>
-              <a:t>41</a:t>
+              <a:t>42</a:t>
             </a:fld>
             <a:endParaRPr lang="es-ES" dirty="0">
               <a:cs typeface="Segoe UI Light" panose="020B0502040204020203" pitchFamily="34" charset="0"/>
@@ -24962,7 +25107,7 @@
 </p:sld>
 </file>
 
-<file path=ppt/slides/slide42.xml><?xml version="1.0" encoding="utf-8"?>
+<file path=ppt/slides/slide43.xml><?xml version="1.0" encoding="utf-8"?>
 <p:sld xmlns:a="http://schemas.openxmlformats.org/drawingml/2006/main" xmlns:r="http://schemas.openxmlformats.org/officeDocument/2006/relationships" xmlns:p="http://schemas.openxmlformats.org/presentationml/2006/main">
   <p:cSld>
     <p:spTree>
@@ -25508,6 +25653,721 @@
       </p:grpSpPr>
       <p:sp>
         <p:nvSpPr>
+          <p:cNvPr id="5" name="Title 1"/>
+          <p:cNvSpPr>
+            <a:spLocks noGrp="1"/>
+          </p:cNvSpPr>
+          <p:nvPr>
+            <p:ph type="title"/>
+          </p:nvPr>
+        </p:nvSpPr>
+        <p:spPr/>
+        <p:txBody>
+          <a:bodyPr/>
+          <a:lstStyle/>
+          <a:p>
+            <a:r>
+              <a:rPr lang="es-ES_tradnl"/>
+              <a:t>Typescript</a:t>
+            </a:r>
+            <a:endParaRPr lang="es-ES_tradnl" dirty="0"/>
+          </a:p>
+        </p:txBody>
+      </p:sp>
+      <p:sp>
+        <p:nvSpPr>
+          <p:cNvPr id="6" name="Rectangle 5"/>
+          <p:cNvSpPr/>
+          <p:nvPr/>
+        </p:nvSpPr>
+        <p:spPr>
+          <a:xfrm>
+            <a:off x="566229" y="1628526"/>
+            <a:ext cx="12311931" cy="895813"/>
+          </a:xfrm>
+          <a:prstGeom prst="rect">
+            <a:avLst/>
+          </a:prstGeom>
+          <a:solidFill>
+            <a:srgbClr val="2D89EF"/>
+          </a:solidFill>
+        </p:spPr>
+        <p:style>
+          <a:lnRef idx="1">
+            <a:schemeClr val="accent1"/>
+          </a:lnRef>
+          <a:fillRef idx="3">
+            <a:schemeClr val="accent1"/>
+          </a:fillRef>
+          <a:effectRef idx="2">
+            <a:schemeClr val="accent1"/>
+          </a:effectRef>
+          <a:fontRef idx="minor">
+            <a:schemeClr val="lt1"/>
+          </a:fontRef>
+        </p:style>
+        <p:txBody>
+          <a:bodyPr rtlCol="0" anchor="ctr"/>
+          <a:lstStyle/>
+          <a:p>
+            <a:pPr algn="ctr"/>
+            <a:r>
+              <a:rPr lang="en-GB" sz="2352" dirty="0"/>
+              <a:t>Typescript </a:t>
+            </a:r>
+            <a:r>
+              <a:rPr lang="en-GB" sz="2352" dirty="0" err="1"/>
+              <a:t>es</a:t>
+            </a:r>
+            <a:r>
+              <a:rPr lang="en-GB" sz="2352" dirty="0"/>
+              <a:t> un </a:t>
+            </a:r>
+            <a:r>
+              <a:rPr lang="en-GB" sz="2352" dirty="0" err="1"/>
+              <a:t>lenguaje</a:t>
+            </a:r>
+            <a:r>
+              <a:rPr lang="en-GB" sz="2352" dirty="0"/>
+              <a:t> open source, </a:t>
+            </a:r>
+            <a:r>
+              <a:rPr lang="en-GB" sz="2352" dirty="0" err="1"/>
+              <a:t>cuyo</a:t>
+            </a:r>
+            <a:r>
+              <a:rPr lang="en-GB" sz="2352" dirty="0"/>
+              <a:t> </a:t>
+            </a:r>
+            <a:r>
+              <a:rPr lang="en-GB" sz="2352" dirty="0" err="1"/>
+              <a:t>resultado</a:t>
+            </a:r>
+            <a:r>
+              <a:rPr lang="en-GB" sz="2352" dirty="0"/>
+              <a:t> de </a:t>
+            </a:r>
+            <a:r>
+              <a:rPr lang="en-GB" sz="2352" dirty="0" err="1"/>
+              <a:t>transpilación</a:t>
+            </a:r>
+            <a:r>
+              <a:rPr lang="en-GB" sz="2352" dirty="0"/>
+              <a:t> </a:t>
+            </a:r>
+            <a:r>
+              <a:rPr lang="en-GB" sz="2352" dirty="0" err="1"/>
+              <a:t>puede</a:t>
+            </a:r>
+            <a:r>
+              <a:rPr lang="en-GB" sz="2352" dirty="0"/>
+              <a:t> </a:t>
+            </a:r>
+            <a:r>
+              <a:rPr lang="en-GB" sz="2352" dirty="0" err="1"/>
+              <a:t>ser</a:t>
+            </a:r>
+            <a:r>
+              <a:rPr lang="en-GB" sz="2352" dirty="0"/>
+              <a:t> ES5 o ES6 (</a:t>
+            </a:r>
+            <a:r>
+              <a:rPr lang="en-GB" sz="2352" dirty="0" err="1"/>
+              <a:t>es</a:t>
+            </a:r>
+            <a:r>
+              <a:rPr lang="en-GB" sz="2352" dirty="0"/>
+              <a:t> </a:t>
+            </a:r>
+            <a:r>
+              <a:rPr lang="en-GB" sz="2352" dirty="0" err="1"/>
+              <a:t>decir</a:t>
+            </a:r>
+            <a:r>
+              <a:rPr lang="en-GB" sz="2352" dirty="0"/>
+              <a:t> </a:t>
+            </a:r>
+            <a:r>
+              <a:rPr lang="en-GB" sz="2352" dirty="0" err="1"/>
+              <a:t>javascript</a:t>
+            </a:r>
+            <a:r>
+              <a:rPr lang="en-GB" sz="2352" dirty="0"/>
+              <a:t>), </a:t>
+            </a:r>
+            <a:r>
+              <a:rPr lang="en-GB" sz="2352" dirty="0" err="1"/>
+              <a:t>ideado</a:t>
+            </a:r>
+            <a:r>
+              <a:rPr lang="en-GB" sz="2352" dirty="0"/>
+              <a:t> </a:t>
+            </a:r>
+            <a:r>
+              <a:rPr lang="en-GB" sz="2352" dirty="0" err="1"/>
+              <a:t>por</a:t>
+            </a:r>
+            <a:r>
+              <a:rPr lang="en-GB" sz="2352" dirty="0"/>
+              <a:t> Microsoft, </a:t>
+            </a:r>
+            <a:r>
+              <a:rPr lang="en-GB" sz="2352" dirty="0" err="1"/>
+              <a:t>adoptado</a:t>
+            </a:r>
+            <a:r>
+              <a:rPr lang="en-GB" sz="2352" dirty="0"/>
+              <a:t> </a:t>
+            </a:r>
+            <a:r>
+              <a:rPr lang="en-GB" sz="2352" dirty="0" err="1"/>
+              <a:t>por</a:t>
+            </a:r>
+            <a:r>
+              <a:rPr lang="en-GB" sz="2352" dirty="0"/>
+              <a:t> </a:t>
+            </a:r>
+            <a:r>
+              <a:rPr lang="en-GB" sz="2352" dirty="0" err="1"/>
+              <a:t>empresas</a:t>
+            </a:r>
+            <a:r>
+              <a:rPr lang="en-GB" sz="2352" dirty="0"/>
+              <a:t> </a:t>
+            </a:r>
+            <a:r>
+              <a:rPr lang="en-GB" sz="2352" dirty="0" err="1"/>
+              <a:t>como</a:t>
+            </a:r>
+            <a:r>
+              <a:rPr lang="en-GB" sz="2352" dirty="0"/>
+              <a:t> Google.</a:t>
+            </a:r>
+            <a:endParaRPr lang="es-ES" sz="2352" dirty="0"/>
+          </a:p>
+        </p:txBody>
+      </p:sp>
+      <p:sp>
+        <p:nvSpPr>
+          <p:cNvPr id="7" name="Rectangle 6"/>
+          <p:cNvSpPr/>
+          <p:nvPr/>
+        </p:nvSpPr>
+        <p:spPr>
+          <a:xfrm>
+            <a:off x="566229" y="2608635"/>
+            <a:ext cx="12311931" cy="926839"/>
+          </a:xfrm>
+          <a:prstGeom prst="rect">
+            <a:avLst/>
+          </a:prstGeom>
+          <a:solidFill>
+            <a:srgbClr val="2D89EF"/>
+          </a:solidFill>
+        </p:spPr>
+        <p:style>
+          <a:lnRef idx="1">
+            <a:schemeClr val="accent1"/>
+          </a:lnRef>
+          <a:fillRef idx="3">
+            <a:schemeClr val="accent1"/>
+          </a:fillRef>
+          <a:effectRef idx="2">
+            <a:schemeClr val="accent1"/>
+          </a:effectRef>
+          <a:fontRef idx="minor">
+            <a:schemeClr val="lt1"/>
+          </a:fontRef>
+        </p:style>
+        <p:txBody>
+          <a:bodyPr rtlCol="0" anchor="ctr"/>
+          <a:lstStyle/>
+          <a:p>
+            <a:pPr algn="ctr"/>
+            <a:r>
+              <a:rPr lang="en-GB" sz="2352" dirty="0" err="1"/>
+              <a:t>Es</a:t>
+            </a:r>
+            <a:r>
+              <a:rPr lang="en-GB" sz="2352" dirty="0"/>
+              <a:t> 100% compatible con typescript, solo </a:t>
+            </a:r>
+            <a:r>
+              <a:rPr lang="en-GB" sz="2352" dirty="0" err="1"/>
+              <a:t>tenemos</a:t>
+            </a:r>
+            <a:r>
+              <a:rPr lang="en-GB" sz="2352" dirty="0"/>
+              <a:t> que </a:t>
+            </a:r>
+            <a:r>
+              <a:rPr lang="en-GB" sz="2352" dirty="0" err="1"/>
+              <a:t>hacer</a:t>
+            </a:r>
+            <a:r>
+              <a:rPr lang="en-GB" sz="2352" dirty="0"/>
+              <a:t> la </a:t>
+            </a:r>
+            <a:r>
+              <a:rPr lang="en-GB" sz="2352" dirty="0" err="1"/>
+              <a:t>prueba</a:t>
+            </a:r>
+            <a:r>
+              <a:rPr lang="en-GB" sz="2352" dirty="0"/>
+              <a:t> y </a:t>
+            </a:r>
+            <a:r>
+              <a:rPr lang="en-GB" sz="2352" dirty="0" err="1"/>
+              <a:t>renombrar</a:t>
+            </a:r>
+            <a:r>
+              <a:rPr lang="en-GB" sz="2352" dirty="0"/>
+              <a:t> un .</a:t>
+            </a:r>
+            <a:r>
+              <a:rPr lang="en-GB" sz="2352" dirty="0" err="1"/>
+              <a:t>js</a:t>
+            </a:r>
+            <a:r>
+              <a:rPr lang="en-GB" sz="2352" dirty="0"/>
+              <a:t> a .</a:t>
+            </a:r>
+            <a:r>
+              <a:rPr lang="en-GB" sz="2352" dirty="0" err="1"/>
+              <a:t>ts</a:t>
+            </a:r>
+            <a:r>
+              <a:rPr lang="en-GB" sz="2352" dirty="0"/>
+              <a:t> y </a:t>
+            </a:r>
+            <a:r>
+              <a:rPr lang="en-GB" sz="2352" dirty="0" err="1"/>
+              <a:t>sigue</a:t>
+            </a:r>
+            <a:r>
+              <a:rPr lang="en-GB" sz="2352" dirty="0"/>
+              <a:t> </a:t>
+            </a:r>
+            <a:r>
+              <a:rPr lang="en-GB" sz="2352" dirty="0" err="1"/>
+              <a:t>funcionando</a:t>
+            </a:r>
+            <a:r>
+              <a:rPr lang="en-GB" sz="2352" dirty="0"/>
+              <a:t>.</a:t>
+            </a:r>
+            <a:endParaRPr lang="es-ES" sz="2352" dirty="0"/>
+          </a:p>
+        </p:txBody>
+      </p:sp>
+      <p:sp>
+        <p:nvSpPr>
+          <p:cNvPr id="8" name="Rectangle 7"/>
+          <p:cNvSpPr/>
+          <p:nvPr/>
+        </p:nvSpPr>
+        <p:spPr>
+          <a:xfrm>
+            <a:off x="566229" y="3640451"/>
+            <a:ext cx="12311931" cy="877340"/>
+          </a:xfrm>
+          <a:prstGeom prst="rect">
+            <a:avLst/>
+          </a:prstGeom>
+          <a:solidFill>
+            <a:srgbClr val="2D89EF"/>
+          </a:solidFill>
+        </p:spPr>
+        <p:style>
+          <a:lnRef idx="1">
+            <a:schemeClr val="accent1"/>
+          </a:lnRef>
+          <a:fillRef idx="3">
+            <a:schemeClr val="accent1"/>
+          </a:fillRef>
+          <a:effectRef idx="2">
+            <a:schemeClr val="accent1"/>
+          </a:effectRef>
+          <a:fontRef idx="minor">
+            <a:schemeClr val="lt1"/>
+          </a:fontRef>
+        </p:style>
+        <p:txBody>
+          <a:bodyPr rtlCol="0" anchor="ctr"/>
+          <a:lstStyle/>
+          <a:p>
+            <a:pPr algn="ctr"/>
+            <a:r>
+              <a:rPr lang="es-ES" sz="2352" dirty="0"/>
+              <a:t>¿ Qué nos da? Dos características principales: tipos + </a:t>
+            </a:r>
+            <a:r>
+              <a:rPr lang="es-ES" sz="2352" dirty="0" err="1"/>
+              <a:t>intellisense</a:t>
+            </a:r>
+            <a:r>
+              <a:rPr lang="es-ES" sz="2352" dirty="0"/>
+              <a:t> y errores en tiempo de </a:t>
+            </a:r>
+            <a:r>
+              <a:rPr lang="es-ES" sz="2352" dirty="0" err="1"/>
+              <a:t>transpilación</a:t>
+            </a:r>
+            <a:r>
+              <a:rPr lang="es-ES" sz="2352" dirty="0"/>
+              <a:t>… dejándonos también puerta abierta a lo dinámico (</a:t>
+            </a:r>
+            <a:r>
+              <a:rPr lang="es-ES" sz="2352" dirty="0" err="1"/>
+              <a:t>e.g</a:t>
+            </a:r>
+            <a:r>
+              <a:rPr lang="es-ES" sz="2352" dirty="0"/>
+              <a:t>. </a:t>
+            </a:r>
+            <a:r>
+              <a:rPr lang="es-ES" sz="2352" dirty="0" err="1"/>
+              <a:t>any</a:t>
+            </a:r>
+            <a:r>
+              <a:rPr lang="es-ES" sz="2352" dirty="0"/>
+              <a:t>). PRODUCTIVIDAD</a:t>
+            </a:r>
+          </a:p>
+        </p:txBody>
+      </p:sp>
+      <p:sp>
+        <p:nvSpPr>
+          <p:cNvPr id="9" name="Rectangle 8"/>
+          <p:cNvSpPr/>
+          <p:nvPr/>
+        </p:nvSpPr>
+        <p:spPr>
+          <a:xfrm>
+            <a:off x="566228" y="4622768"/>
+            <a:ext cx="12311931" cy="877340"/>
+          </a:xfrm>
+          <a:prstGeom prst="rect">
+            <a:avLst/>
+          </a:prstGeom>
+          <a:solidFill>
+            <a:srgbClr val="2D89EF"/>
+          </a:solidFill>
+        </p:spPr>
+        <p:style>
+          <a:lnRef idx="1">
+            <a:schemeClr val="accent1"/>
+          </a:lnRef>
+          <a:fillRef idx="3">
+            <a:schemeClr val="accent1"/>
+          </a:fillRef>
+          <a:effectRef idx="2">
+            <a:schemeClr val="accent1"/>
+          </a:effectRef>
+          <a:fontRef idx="minor">
+            <a:schemeClr val="lt1"/>
+          </a:fontRef>
+        </p:style>
+        <p:txBody>
+          <a:bodyPr rtlCol="0" anchor="ctr"/>
+          <a:lstStyle/>
+          <a:p>
+            <a:pPr algn="ctr"/>
+            <a:r>
+              <a:rPr lang="es-ES" sz="2352" dirty="0"/>
+              <a:t>El objetivo de </a:t>
+            </a:r>
+            <a:r>
+              <a:rPr lang="es-ES" sz="2352" dirty="0" err="1"/>
+              <a:t>typescript</a:t>
+            </a:r>
+            <a:r>
+              <a:rPr lang="es-ES" sz="2352" dirty="0"/>
+              <a:t> es que en unos años desaparezca, si una versión más moderna de ES incorporar dicho nivel de productividad </a:t>
+            </a:r>
+          </a:p>
+        </p:txBody>
+      </p:sp>
+    </p:spTree>
+    <p:extLst>
+      <p:ext uri="{BB962C8B-B14F-4D97-AF65-F5344CB8AC3E}">
+        <p14:creationId xmlns:p14="http://schemas.microsoft.com/office/powerpoint/2010/main" val="3088926654"/>
+      </p:ext>
+    </p:extLst>
+  </p:cSld>
+  <p:clrMapOvr>
+    <a:masterClrMapping/>
+  </p:clrMapOvr>
+  <p:timing>
+    <p:tnLst>
+      <p:par>
+        <p:cTn id="1" dur="indefinite" restart="never" nodeType="tmRoot">
+          <p:childTnLst>
+            <p:seq concurrent="1" nextAc="seek">
+              <p:cTn id="2" dur="indefinite" nodeType="mainSeq">
+                <p:childTnLst>
+                  <p:par>
+                    <p:cTn id="3" fill="hold">
+                      <p:stCondLst>
+                        <p:cond delay="indefinite"/>
+                      </p:stCondLst>
+                      <p:childTnLst>
+                        <p:par>
+                          <p:cTn id="4" fill="hold">
+                            <p:stCondLst>
+                              <p:cond delay="0"/>
+                            </p:stCondLst>
+                            <p:childTnLst>
+                              <p:par>
+                                <p:cTn id="5" presetID="10" presetClass="entr" presetSubtype="0" fill="hold" grpId="0" nodeType="clickEffect">
+                                  <p:stCondLst>
+                                    <p:cond delay="0"/>
+                                  </p:stCondLst>
+                                  <p:childTnLst>
+                                    <p:set>
+                                      <p:cBhvr>
+                                        <p:cTn id="6" dur="1" fill="hold">
+                                          <p:stCondLst>
+                                            <p:cond delay="0"/>
+                                          </p:stCondLst>
+                                        </p:cTn>
+                                        <p:tgtEl>
+                                          <p:spTgt spid="6"/>
+                                        </p:tgtEl>
+                                        <p:attrNameLst>
+                                          <p:attrName>style.visibility</p:attrName>
+                                        </p:attrNameLst>
+                                      </p:cBhvr>
+                                      <p:to>
+                                        <p:strVal val="visible"/>
+                                      </p:to>
+                                    </p:set>
+                                    <p:animEffect transition="in" filter="fade">
+                                      <p:cBhvr>
+                                        <p:cTn id="7" dur="500"/>
+                                        <p:tgtEl>
+                                          <p:spTgt spid="6"/>
+                                        </p:tgtEl>
+                                      </p:cBhvr>
+                                    </p:animEffect>
+                                  </p:childTnLst>
+                                </p:cTn>
+                              </p:par>
+                            </p:childTnLst>
+                          </p:cTn>
+                        </p:par>
+                      </p:childTnLst>
+                    </p:cTn>
+                  </p:par>
+                  <p:par>
+                    <p:cTn id="8" fill="hold">
+                      <p:stCondLst>
+                        <p:cond delay="indefinite"/>
+                      </p:stCondLst>
+                      <p:childTnLst>
+                        <p:par>
+                          <p:cTn id="9" fill="hold">
+                            <p:stCondLst>
+                              <p:cond delay="0"/>
+                            </p:stCondLst>
+                            <p:childTnLst>
+                              <p:par>
+                                <p:cTn id="10" presetID="10" presetClass="entr" presetSubtype="0" fill="hold" grpId="0" nodeType="clickEffect">
+                                  <p:stCondLst>
+                                    <p:cond delay="0"/>
+                                  </p:stCondLst>
+                                  <p:childTnLst>
+                                    <p:set>
+                                      <p:cBhvr>
+                                        <p:cTn id="11" dur="1" fill="hold">
+                                          <p:stCondLst>
+                                            <p:cond delay="0"/>
+                                          </p:stCondLst>
+                                        </p:cTn>
+                                        <p:tgtEl>
+                                          <p:spTgt spid="7"/>
+                                        </p:tgtEl>
+                                        <p:attrNameLst>
+                                          <p:attrName>style.visibility</p:attrName>
+                                        </p:attrNameLst>
+                                      </p:cBhvr>
+                                      <p:to>
+                                        <p:strVal val="visible"/>
+                                      </p:to>
+                                    </p:set>
+                                    <p:animEffect transition="in" filter="fade">
+                                      <p:cBhvr>
+                                        <p:cTn id="12" dur="500"/>
+                                        <p:tgtEl>
+                                          <p:spTgt spid="7"/>
+                                        </p:tgtEl>
+                                      </p:cBhvr>
+                                    </p:animEffect>
+                                  </p:childTnLst>
+                                </p:cTn>
+                              </p:par>
+                            </p:childTnLst>
+                          </p:cTn>
+                        </p:par>
+                      </p:childTnLst>
+                    </p:cTn>
+                  </p:par>
+                  <p:par>
+                    <p:cTn id="13" fill="hold">
+                      <p:stCondLst>
+                        <p:cond delay="indefinite"/>
+                      </p:stCondLst>
+                      <p:childTnLst>
+                        <p:par>
+                          <p:cTn id="14" fill="hold">
+                            <p:stCondLst>
+                              <p:cond delay="0"/>
+                            </p:stCondLst>
+                            <p:childTnLst>
+                              <p:par>
+                                <p:cTn id="15" presetID="10" presetClass="entr" presetSubtype="0" fill="hold" grpId="0" nodeType="clickEffect">
+                                  <p:stCondLst>
+                                    <p:cond delay="0"/>
+                                  </p:stCondLst>
+                                  <p:childTnLst>
+                                    <p:set>
+                                      <p:cBhvr>
+                                        <p:cTn id="16" dur="1" fill="hold">
+                                          <p:stCondLst>
+                                            <p:cond delay="0"/>
+                                          </p:stCondLst>
+                                        </p:cTn>
+                                        <p:tgtEl>
+                                          <p:spTgt spid="8"/>
+                                        </p:tgtEl>
+                                        <p:attrNameLst>
+                                          <p:attrName>style.visibility</p:attrName>
+                                        </p:attrNameLst>
+                                      </p:cBhvr>
+                                      <p:to>
+                                        <p:strVal val="visible"/>
+                                      </p:to>
+                                    </p:set>
+                                    <p:animEffect transition="in" filter="fade">
+                                      <p:cBhvr>
+                                        <p:cTn id="17" dur="500"/>
+                                        <p:tgtEl>
+                                          <p:spTgt spid="8"/>
+                                        </p:tgtEl>
+                                      </p:cBhvr>
+                                    </p:animEffect>
+                                  </p:childTnLst>
+                                </p:cTn>
+                              </p:par>
+                            </p:childTnLst>
+                          </p:cTn>
+                        </p:par>
+                      </p:childTnLst>
+                    </p:cTn>
+                  </p:par>
+                  <p:par>
+                    <p:cTn id="18" fill="hold">
+                      <p:stCondLst>
+                        <p:cond delay="indefinite"/>
+                      </p:stCondLst>
+                      <p:childTnLst>
+                        <p:par>
+                          <p:cTn id="19" fill="hold">
+                            <p:stCondLst>
+                              <p:cond delay="0"/>
+                            </p:stCondLst>
+                            <p:childTnLst>
+                              <p:par>
+                                <p:cTn id="20" presetID="10" presetClass="entr" presetSubtype="0" fill="hold" grpId="0" nodeType="clickEffect">
+                                  <p:stCondLst>
+                                    <p:cond delay="0"/>
+                                  </p:stCondLst>
+                                  <p:childTnLst>
+                                    <p:set>
+                                      <p:cBhvr>
+                                        <p:cTn id="21" dur="1" fill="hold">
+                                          <p:stCondLst>
+                                            <p:cond delay="0"/>
+                                          </p:stCondLst>
+                                        </p:cTn>
+                                        <p:tgtEl>
+                                          <p:spTgt spid="9"/>
+                                        </p:tgtEl>
+                                        <p:attrNameLst>
+                                          <p:attrName>style.visibility</p:attrName>
+                                        </p:attrNameLst>
+                                      </p:cBhvr>
+                                      <p:to>
+                                        <p:strVal val="visible"/>
+                                      </p:to>
+                                    </p:set>
+                                    <p:animEffect transition="in" filter="fade">
+                                      <p:cBhvr>
+                                        <p:cTn id="22" dur="500"/>
+                                        <p:tgtEl>
+                                          <p:spTgt spid="9"/>
+                                        </p:tgtEl>
+                                      </p:cBhvr>
+                                    </p:animEffect>
+                                  </p:childTnLst>
+                                </p:cTn>
+                              </p:par>
+                            </p:childTnLst>
+                          </p:cTn>
+                        </p:par>
+                      </p:childTnLst>
+                    </p:cTn>
+                  </p:par>
+                </p:childTnLst>
+              </p:cTn>
+              <p:prevCondLst>
+                <p:cond evt="onPrev" delay="0">
+                  <p:tgtEl>
+                    <p:sldTgt/>
+                  </p:tgtEl>
+                </p:cond>
+              </p:prevCondLst>
+              <p:nextCondLst>
+                <p:cond evt="onNext" delay="0">
+                  <p:tgtEl>
+                    <p:sldTgt/>
+                  </p:tgtEl>
+                </p:cond>
+              </p:nextCondLst>
+            </p:seq>
+          </p:childTnLst>
+        </p:cTn>
+      </p:par>
+    </p:tnLst>
+    <p:bldLst>
+      <p:bldP spid="6" grpId="0" animBg="1"/>
+      <p:bldP spid="7" grpId="0" animBg="1"/>
+      <p:bldP spid="8" grpId="0" animBg="1"/>
+      <p:bldP spid="9" grpId="0" animBg="1"/>
+    </p:bldLst>
+  </p:timing>
+</p:sld>
+</file>
+
+<file path=ppt/slides/slide8.xml><?xml version="1.0" encoding="utf-8"?>
+<p:sld xmlns:a="http://schemas.openxmlformats.org/drawingml/2006/main" xmlns:r="http://schemas.openxmlformats.org/officeDocument/2006/relationships" xmlns:p="http://schemas.openxmlformats.org/presentationml/2006/main">
+  <p:cSld>
+    <p:spTree>
+      <p:nvGrpSpPr>
+        <p:cNvPr id="1" name=""/>
+        <p:cNvGrpSpPr/>
+        <p:nvPr/>
+      </p:nvGrpSpPr>
+      <p:grpSpPr>
+        <a:xfrm>
+          <a:off x="0" y="0"/>
+          <a:ext cx="0" cy="0"/>
+          <a:chOff x="0" y="0"/>
+          <a:chExt cx="0" cy="0"/>
+        </a:xfrm>
+      </p:grpSpPr>
+      <p:sp>
+        <p:nvSpPr>
           <p:cNvPr id="4" name="Título 3">
             <a:extLst>
               <a:ext uri="{FF2B5EF4-FFF2-40B4-BE49-F238E27FC236}">
@@ -25576,137 +26436,6 @@
     <p:extLst>
       <p:ext uri="{BB962C8B-B14F-4D97-AF65-F5344CB8AC3E}">
         <p14:creationId xmlns:p14="http://schemas.microsoft.com/office/powerpoint/2010/main" val="1985039315"/>
-      </p:ext>
-    </p:extLst>
-  </p:cSld>
-  <p:clrMapOvr>
-    <a:masterClrMapping/>
-  </p:clrMapOvr>
-</p:sld>
-</file>
-
-<file path=ppt/slides/slide8.xml><?xml version="1.0" encoding="utf-8"?>
-<p:sld xmlns:a="http://schemas.openxmlformats.org/drawingml/2006/main" xmlns:r="http://schemas.openxmlformats.org/officeDocument/2006/relationships" xmlns:p="http://schemas.openxmlformats.org/presentationml/2006/main">
-  <p:cSld>
-    <p:spTree>
-      <p:nvGrpSpPr>
-        <p:cNvPr id="1" name=""/>
-        <p:cNvGrpSpPr/>
-        <p:nvPr/>
-      </p:nvGrpSpPr>
-      <p:grpSpPr>
-        <a:xfrm>
-          <a:off x="0" y="0"/>
-          <a:ext cx="0" cy="0"/>
-          <a:chOff x="0" y="0"/>
-          <a:chExt cx="0" cy="0"/>
-        </a:xfrm>
-      </p:grpSpPr>
-      <p:sp>
-        <p:nvSpPr>
-          <p:cNvPr id="4" name="Marcador de contenido 3">
-            <a:extLst>
-              <a:ext uri="{FF2B5EF4-FFF2-40B4-BE49-F238E27FC236}">
-                <a16:creationId xmlns:a16="http://schemas.microsoft.com/office/drawing/2014/main" id="{5069277E-A941-4877-A86F-F7F094FA2E5B}"/>
-              </a:ext>
-            </a:extLst>
-          </p:cNvPr>
-          <p:cNvSpPr>
-            <a:spLocks noGrp="1"/>
-          </p:cNvSpPr>
-          <p:nvPr>
-            <p:ph idx="1"/>
-          </p:nvPr>
-        </p:nvSpPr>
-        <p:spPr/>
-        <p:txBody>
-          <a:bodyPr>
-            <a:normAutofit/>
-          </a:bodyPr>
-          <a:lstStyle/>
-          <a:p>
-            <a:r>
-              <a:rPr lang="es-ES" sz="2800" dirty="0"/>
-              <a:t>Es un fichero donde almacenamos las opciones de compilación que vamos a usar en nuestro proyecto</a:t>
-            </a:r>
-          </a:p>
-          <a:p>
-            <a:r>
-              <a:rPr lang="es-ES" sz="2800" dirty="0"/>
-              <a:t>Se especifica que ficheros se incluyen o excluyen de la configuración</a:t>
-            </a:r>
-          </a:p>
-          <a:p>
-            <a:r>
-              <a:rPr lang="es-ES" sz="2800" dirty="0"/>
-              <a:t>Admite herencia de configuración</a:t>
-            </a:r>
-          </a:p>
-        </p:txBody>
-      </p:sp>
-      <p:sp>
-        <p:nvSpPr>
-          <p:cNvPr id="3" name="Título 2">
-            <a:extLst>
-              <a:ext uri="{FF2B5EF4-FFF2-40B4-BE49-F238E27FC236}">
-                <a16:creationId xmlns:a16="http://schemas.microsoft.com/office/drawing/2014/main" id="{4E1855B4-DCC7-4CBB-A78C-0F99275A879B}"/>
-              </a:ext>
-            </a:extLst>
-          </p:cNvPr>
-          <p:cNvSpPr>
-            <a:spLocks noGrp="1"/>
-          </p:cNvSpPr>
-          <p:nvPr>
-            <p:ph type="title"/>
-          </p:nvPr>
-        </p:nvSpPr>
-        <p:spPr/>
-        <p:txBody>
-          <a:bodyPr/>
-          <a:lstStyle/>
-          <a:p>
-            <a:r>
-              <a:rPr lang="es-ES" dirty="0" err="1"/>
-              <a:t>Tsconfig.json</a:t>
-            </a:r>
-            <a:endParaRPr lang="es-ES" dirty="0"/>
-          </a:p>
-        </p:txBody>
-      </p:sp>
-      <p:pic>
-        <p:nvPicPr>
-          <p:cNvPr id="5" name="Imagen 4">
-            <a:extLst>
-              <a:ext uri="{FF2B5EF4-FFF2-40B4-BE49-F238E27FC236}">
-                <a16:creationId xmlns:a16="http://schemas.microsoft.com/office/drawing/2014/main" id="{C4D5003B-190E-412D-B43A-4504F0C2AFCA}"/>
-              </a:ext>
-            </a:extLst>
-          </p:cNvPr>
-          <p:cNvPicPr>
-            <a:picLocks noChangeAspect="1"/>
-          </p:cNvPicPr>
-          <p:nvPr/>
-        </p:nvPicPr>
-        <p:blipFill>
-          <a:blip r:embed="rId2"/>
-          <a:stretch>
-            <a:fillRect/>
-          </a:stretch>
-        </p:blipFill>
-        <p:spPr>
-          <a:xfrm>
-            <a:off x="2905051" y="3420591"/>
-            <a:ext cx="8063061" cy="3734310"/>
-          </a:xfrm>
-          <a:prstGeom prst="rect">
-            <a:avLst/>
-          </a:prstGeom>
-        </p:spPr>
-      </p:pic>
-    </p:spTree>
-    <p:extLst>
-      <p:ext uri="{BB962C8B-B14F-4D97-AF65-F5344CB8AC3E}">
-        <p14:creationId xmlns:p14="http://schemas.microsoft.com/office/powerpoint/2010/main" val="2377831548"/>
       </p:ext>
     </p:extLst>
   </p:cSld>
@@ -25735,10 +26464,52 @@
       </p:grpSpPr>
       <p:sp>
         <p:nvSpPr>
-          <p:cNvPr id="5" name="Título 4">
+          <p:cNvPr id="4" name="Marcador de contenido 3">
             <a:extLst>
               <a:ext uri="{FF2B5EF4-FFF2-40B4-BE49-F238E27FC236}">
-                <a16:creationId xmlns:a16="http://schemas.microsoft.com/office/drawing/2014/main" id="{351C640C-3C52-429A-B6F6-C706D06F6FB1}"/>
+                <a16:creationId xmlns:a16="http://schemas.microsoft.com/office/drawing/2014/main" id="{5069277E-A941-4877-A86F-F7F094FA2E5B}"/>
+              </a:ext>
+            </a:extLst>
+          </p:cNvPr>
+          <p:cNvSpPr>
+            <a:spLocks noGrp="1"/>
+          </p:cNvSpPr>
+          <p:nvPr>
+            <p:ph idx="1"/>
+          </p:nvPr>
+        </p:nvSpPr>
+        <p:spPr/>
+        <p:txBody>
+          <a:bodyPr>
+            <a:normAutofit/>
+          </a:bodyPr>
+          <a:lstStyle/>
+          <a:p>
+            <a:r>
+              <a:rPr lang="es-ES" sz="2800" dirty="0"/>
+              <a:t>Es un fichero donde almacenamos las opciones de compilación que vamos a usar en nuestro proyecto</a:t>
+            </a:r>
+          </a:p>
+          <a:p>
+            <a:r>
+              <a:rPr lang="es-ES" sz="2800" dirty="0"/>
+              <a:t>Se especifica que ficheros se incluyen o excluyen de la configuración</a:t>
+            </a:r>
+          </a:p>
+          <a:p>
+            <a:r>
+              <a:rPr lang="es-ES" sz="2800" dirty="0"/>
+              <a:t>Admite herencia de configuración</a:t>
+            </a:r>
+          </a:p>
+        </p:txBody>
+      </p:sp>
+      <p:sp>
+        <p:nvSpPr>
+          <p:cNvPr id="3" name="Título 2">
+            <a:extLst>
+              <a:ext uri="{FF2B5EF4-FFF2-40B4-BE49-F238E27FC236}">
+                <a16:creationId xmlns:a16="http://schemas.microsoft.com/office/drawing/2014/main" id="{4E1855B4-DCC7-4CBB-A78C-0F99275A879B}"/>
               </a:ext>
             </a:extLst>
           </p:cNvPr>
@@ -25755,102 +26526,47 @@
           <a:lstStyle/>
           <a:p>
             <a:r>
-              <a:rPr lang="es-ES" dirty="0"/>
-              <a:t>Tipos  </a:t>
-            </a:r>
-          </a:p>
-        </p:txBody>
-      </p:sp>
-      <p:sp>
-        <p:nvSpPr>
-          <p:cNvPr id="4" name="Marcador de número de diapositiva 3">
+              <a:rPr lang="es-ES" dirty="0" err="1"/>
+              <a:t>Tsconfig.json</a:t>
+            </a:r>
+            <a:endParaRPr lang="es-ES" dirty="0"/>
+          </a:p>
+        </p:txBody>
+      </p:sp>
+      <p:pic>
+        <p:nvPicPr>
+          <p:cNvPr id="5" name="Imagen 4">
             <a:extLst>
               <a:ext uri="{FF2B5EF4-FFF2-40B4-BE49-F238E27FC236}">
-                <a16:creationId xmlns:a16="http://schemas.microsoft.com/office/drawing/2014/main" id="{B3ABA005-E654-4189-9CC8-13F86F34DFC4}"/>
-              </a:ext>
-            </a:extLst>
-          </p:cNvPr>
-          <p:cNvSpPr>
-            <a:spLocks noGrp="1"/>
-          </p:cNvSpPr>
-          <p:nvPr>
-            <p:ph type="sldNum" sz="quarter" idx="4294967295"/>
-          </p:nvPr>
-        </p:nvSpPr>
-        <p:spPr>
-          <a:xfrm>
-            <a:off x="0" y="6897688"/>
-            <a:ext cx="661988" cy="468312"/>
-          </a:xfrm>
-        </p:spPr>
-        <p:txBody>
-          <a:bodyPr/>
-          <a:lstStyle/>
-          <a:p>
-            <a:fld id="{C0C6E1E5-C711-49C2-AC1C-A8C0A200779D}" type="slidenum">
-              <a:rPr lang="es-ES" smtClean="0">
-                <a:cs typeface="Segoe UI Light" panose="020B0502040204020203" pitchFamily="34" charset="0"/>
-              </a:rPr>
-              <a:pPr/>
-              <a:t>9</a:t>
-            </a:fld>
-            <a:endParaRPr lang="es-ES" dirty="0">
-              <a:cs typeface="Segoe UI Light" panose="020B0502040204020203" pitchFamily="34" charset="0"/>
-            </a:endParaRPr>
-          </a:p>
-        </p:txBody>
-      </p:sp>
-      <p:pic>
-        <p:nvPicPr>
-          <p:cNvPr id="3074" name="Picture 2" descr="Imagen relacionada">
-            <a:extLst>
-              <a:ext uri="{FF2B5EF4-FFF2-40B4-BE49-F238E27FC236}">
-                <a16:creationId xmlns:a16="http://schemas.microsoft.com/office/drawing/2014/main" id="{6C230BBC-2B32-4AB7-A0DD-02E9BF6FDD87}"/>
+                <a16:creationId xmlns:a16="http://schemas.microsoft.com/office/drawing/2014/main" id="{C4D5003B-190E-412D-B43A-4504F0C2AFCA}"/>
               </a:ext>
             </a:extLst>
           </p:cNvPr>
           <p:cNvPicPr>
-            <a:picLocks noChangeAspect="1" noChangeArrowheads="1"/>
+            <a:picLocks noChangeAspect="1"/>
           </p:cNvPicPr>
           <p:nvPr/>
         </p:nvPicPr>
         <p:blipFill>
-          <a:blip r:embed="rId2">
-            <a:extLst>
-              <a:ext uri="{28A0092B-C50C-407E-A947-70E740481C1C}">
-                <a14:useLocalDpi xmlns:a14="http://schemas.microsoft.com/office/drawing/2010/main" val="0"/>
-              </a:ext>
-            </a:extLst>
-          </a:blip>
-          <a:srcRect/>
+          <a:blip r:embed="rId2"/>
           <a:stretch>
             <a:fillRect/>
           </a:stretch>
         </p:blipFill>
-        <p:spPr bwMode="auto">
-          <a:xfrm>
-            <a:off x="8011617" y="1836415"/>
-            <a:ext cx="4686521" cy="3960440"/>
-          </a:xfrm>
-          <a:prstGeom prst="rect">
-            <a:avLst/>
-          </a:prstGeom>
-          <a:noFill/>
-          <a:extLst>
-            <a:ext uri="{909E8E84-426E-40DD-AFC4-6F175D3DCCD1}">
-              <a14:hiddenFill xmlns:a14="http://schemas.microsoft.com/office/drawing/2010/main">
-                <a:solidFill>
-                  <a:srgbClr val="FFFFFF"/>
-                </a:solidFill>
-              </a14:hiddenFill>
-            </a:ext>
-          </a:extLst>
+        <p:spPr>
+          <a:xfrm>
+            <a:off x="2905051" y="3420591"/>
+            <a:ext cx="8063061" cy="3734310"/>
+          </a:xfrm>
+          <a:prstGeom prst="rect">
+            <a:avLst/>
+          </a:prstGeom>
         </p:spPr>
       </p:pic>
     </p:spTree>
     <p:extLst>
       <p:ext uri="{BB962C8B-B14F-4D97-AF65-F5344CB8AC3E}">
-        <p14:creationId xmlns:p14="http://schemas.microsoft.com/office/powerpoint/2010/main" val="1339072026"/>
+        <p14:creationId xmlns:p14="http://schemas.microsoft.com/office/powerpoint/2010/main" val="2377831548"/>
       </p:ext>
     </p:extLst>
   </p:cSld>
@@ -26674,21 +27390,6 @@
 </file>
 
 <file path=customXml/item1.xml><?xml version="1.0" encoding="utf-8"?>
-<p:properties xmlns:p="http://schemas.microsoft.com/office/2006/metadata/properties" xmlns:xsi="http://www.w3.org/2001/XMLSchema-instance" xmlns:pc="http://schemas.microsoft.com/office/infopath/2007/PartnerControls">
-  <documentManagement/>
-</p:properties>
-</file>
-
-<file path=customXml/item2.xml><?xml version="1.0" encoding="utf-8"?>
-<?mso-contentType ?>
-<FormTemplates xmlns="http://schemas.microsoft.com/sharepoint/v3/contenttype/forms">
-  <Display>DocumentLibraryForm</Display>
-  <Edit>DocumentLibraryForm</Edit>
-  <New>DocumentLibraryForm</New>
-</FormTemplates>
-</file>
-
-<file path=customXml/item3.xml><?xml version="1.0" encoding="utf-8"?>
 <ct:contentTypeSchema xmlns:ct="http://schemas.microsoft.com/office/2006/metadata/contentType" xmlns:ma="http://schemas.microsoft.com/office/2006/metadata/properties/metaAttributes" ct:_="" ma:_="" ma:contentTypeName="Documento" ma:contentTypeID="0x0101004EE0CF886673FA469809CB134AEE7295" ma:contentTypeVersion="9" ma:contentTypeDescription="Crear nuevo documento." ma:contentTypeScope="" ma:versionID="634bc9bce23b57a9385b29d756ae0c04">
   <xsd:schema xmlns:xsd="http://www.w3.org/2001/XMLSchema" xmlns:xs="http://www.w3.org/2001/XMLSchema" xmlns:p="http://schemas.microsoft.com/office/2006/metadata/properties" xmlns:ns2="3fc376a6-7dd6-488b-97d3-185ba1a312b8" xmlns:ns3="e1478163-bf3c-43ca-9f3f-1606a2a1b2bb" targetNamespace="http://schemas.microsoft.com/office/2006/metadata/properties" ma:root="true" ma:fieldsID="5c88b5c1d50b2dc5a5925ff2671eaedc" ns2:_="" ns3:_="">
     <xsd:import namespace="3fc376a6-7dd6-488b-97d3-185ba1a312b8"/>
@@ -26885,7 +27586,41 @@
 </ct:contentTypeSchema>
 </file>
 
+<file path=customXml/item2.xml><?xml version="1.0" encoding="utf-8"?>
+<p:properties xmlns:p="http://schemas.microsoft.com/office/2006/metadata/properties" xmlns:xsi="http://www.w3.org/2001/XMLSchema-instance" xmlns:pc="http://schemas.microsoft.com/office/infopath/2007/PartnerControls">
+  <documentManagement/>
+</p:properties>
+</file>
+
+<file path=customXml/item3.xml><?xml version="1.0" encoding="utf-8"?>
+<?mso-contentType ?>
+<FormTemplates xmlns="http://schemas.microsoft.com/sharepoint/v3/contenttype/forms">
+  <Display>DocumentLibraryForm</Display>
+  <Edit>DocumentLibraryForm</Edit>
+  <New>DocumentLibraryForm</New>
+</FormTemplates>
+</file>
+
 <file path=customXml/itemProps1.xml><?xml version="1.0" encoding="utf-8"?>
+<ds:datastoreItem xmlns:ds="http://schemas.openxmlformats.org/officeDocument/2006/customXml" ds:itemID="{1801A0D6-1BC1-4244-A0ED-98D7A35279D5}">
+  <ds:schemaRefs>
+    <ds:schemaRef ds:uri="http://schemas.microsoft.com/office/2006/metadata/contentType"/>
+    <ds:schemaRef ds:uri="http://schemas.microsoft.com/office/2006/metadata/properties/metaAttributes"/>
+    <ds:schemaRef ds:uri="http://www.w3.org/2001/XMLSchema"/>
+    <ds:schemaRef ds:uri="http://schemas.microsoft.com/office/2006/metadata/properties"/>
+    <ds:schemaRef ds:uri="3fc376a6-7dd6-488b-97d3-185ba1a312b8"/>
+    <ds:schemaRef ds:uri="e1478163-bf3c-43ca-9f3f-1606a2a1b2bb"/>
+    <ds:schemaRef ds:uri="http://schemas.microsoft.com/office/2006/documentManagement/types"/>
+    <ds:schemaRef ds:uri="http://schemas.microsoft.com/office/infopath/2007/PartnerControls"/>
+    <ds:schemaRef ds:uri="http://schemas.openxmlformats.org/package/2006/metadata/core-properties"/>
+    <ds:schemaRef ds:uri="http://purl.org/dc/elements/1.1/"/>
+    <ds:schemaRef ds:uri="http://purl.org/dc/terms/"/>
+    <ds:schemaRef ds:uri="http://schemas.microsoft.com/internal/obd"/>
+  </ds:schemaRefs>
+</ds:datastoreItem>
+</file>
+
+<file path=customXml/itemProps2.xml><?xml version="1.0" encoding="utf-8"?>
 <ds:datastoreItem xmlns:ds="http://schemas.openxmlformats.org/officeDocument/2006/customXml" ds:itemID="{82132315-85E7-4715-9264-D006C1C7D479}">
   <ds:schemaRefs>
     <ds:schemaRef ds:uri="http://schemas.openxmlformats.org/package/2006/metadata/core-properties"/>
@@ -26902,29 +27637,10 @@
 </ds:datastoreItem>
 </file>
 
-<file path=customXml/itemProps2.xml><?xml version="1.0" encoding="utf-8"?>
+<file path=customXml/itemProps3.xml><?xml version="1.0" encoding="utf-8"?>
 <ds:datastoreItem xmlns:ds="http://schemas.openxmlformats.org/officeDocument/2006/customXml" ds:itemID="{67E17DE3-9FEF-4763-A4CA-466E9F945102}">
   <ds:schemaRefs>
     <ds:schemaRef ds:uri="http://schemas.microsoft.com/sharepoint/v3/contenttype/forms"/>
   </ds:schemaRefs>
 </ds:datastoreItem>
-</file>
-
-<file path=customXml/itemProps3.xml><?xml version="1.0" encoding="utf-8"?>
-<ds:datastoreItem xmlns:ds="http://schemas.openxmlformats.org/officeDocument/2006/customXml" ds:itemID="{1801A0D6-1BC1-4244-A0ED-98D7A35279D5}">
-  <ds:schemaRefs>
-    <ds:schemaRef ds:uri="http://schemas.microsoft.com/office/2006/metadata/contentType"/>
-    <ds:schemaRef ds:uri="http://schemas.microsoft.com/office/2006/metadata/properties/metaAttributes"/>
-    <ds:schemaRef ds:uri="http://www.w3.org/2001/XMLSchema"/>
-    <ds:schemaRef ds:uri="http://schemas.microsoft.com/office/2006/metadata/properties"/>
-    <ds:schemaRef ds:uri="3fc376a6-7dd6-488b-97d3-185ba1a312b8"/>
-    <ds:schemaRef ds:uri="e1478163-bf3c-43ca-9f3f-1606a2a1b2bb"/>
-    <ds:schemaRef ds:uri="http://schemas.microsoft.com/office/2006/documentManagement/types"/>
-    <ds:schemaRef ds:uri="http://schemas.microsoft.com/office/infopath/2007/PartnerControls"/>
-    <ds:schemaRef ds:uri="http://schemas.openxmlformats.org/package/2006/metadata/core-properties"/>
-    <ds:schemaRef ds:uri="http://purl.org/dc/elements/1.1/"/>
-    <ds:schemaRef ds:uri="http://purl.org/dc/terms/"/>
-    <ds:schemaRef ds:uri="http://schemas.microsoft.com/internal/obd"/>
-  </ds:schemaRefs>
-</ds:datastoreItem>
 </file>
</xml_diff>